<commit_message>
Searching and Sorting Lecture updated
</commit_message>
<xml_diff>
--- a/slides/On-Campus/13_02_SearchingAndSorting.pptx
+++ b/slides/On-Campus/13_02_SearchingAndSorting.pptx
@@ -147,774 +147,45 @@
 <pc:chgInfo xmlns:a="http://schemas.openxmlformats.org/drawingml/2006/main" xmlns:r="http://schemas.openxmlformats.org/officeDocument/2006/relationships" xmlns:ac="http://schemas.microsoft.com/office/drawing/2013/main/command" xmlns:pc="http://schemas.microsoft.com/office/powerpoint/2013/main/command">
   <pc:docChgLst>
     <pc:chgData name="Marcia Moraes" userId="c9c67e8a-58e2-4733-9a1c-5d44fec4775b" providerId="ADAL" clId="{4BE1F46D-BD39-4FB2-BFD3-A643AA3399CF}"/>
-    <pc:docChg chg="undo custSel addSld delSld modSld sldOrd modMainMaster">
-      <pc:chgData name="Marcia Moraes" userId="c9c67e8a-58e2-4733-9a1c-5d44fec4775b" providerId="ADAL" clId="{4BE1F46D-BD39-4FB2-BFD3-A643AA3399CF}" dt="2023-04-19T00:32:22.280" v="1423"/>
+  </pc:docChgLst>
+  <pc:docChgLst>
+    <pc:chgData name="Marcia Moraes" userId="c9c67e8a-58e2-4733-9a1c-5d44fec4775b" providerId="ADAL" clId="{E8878AFF-4F97-4DE5-B01D-2357D9320942}"/>
+    <pc:docChg chg="custSel modSld">
+      <pc:chgData name="Marcia Moraes" userId="c9c67e8a-58e2-4733-9a1c-5d44fec4775b" providerId="ADAL" clId="{E8878AFF-4F97-4DE5-B01D-2357D9320942}" dt="2023-11-12T18:49:47" v="1"/>
       <pc:docMkLst>
         <pc:docMk/>
       </pc:docMkLst>
-      <pc:sldChg chg="modSp">
-        <pc:chgData name="Marcia Moraes" userId="c9c67e8a-58e2-4733-9a1c-5d44fec4775b" providerId="ADAL" clId="{4BE1F46D-BD39-4FB2-BFD3-A643AA3399CF}" dt="2023-04-18T23:19:23.369" v="12" actId="6549"/>
-        <pc:sldMkLst>
-          <pc:docMk/>
-          <pc:sldMk cId="661209559" sldId="256"/>
-        </pc:sldMkLst>
-        <pc:spChg chg="mod">
-          <ac:chgData name="Marcia Moraes" userId="c9c67e8a-58e2-4733-9a1c-5d44fec4775b" providerId="ADAL" clId="{4BE1F46D-BD39-4FB2-BFD3-A643AA3399CF}" dt="2023-04-18T23:19:23.369" v="12" actId="6549"/>
-          <ac:spMkLst>
-            <pc:docMk/>
-            <pc:sldMk cId="661209559" sldId="256"/>
-            <ac:spMk id="5" creationId="{2D277C9B-9163-FB49-9FDB-50914D5C9EE4}"/>
-          </ac:spMkLst>
-        </pc:spChg>
-      </pc:sldChg>
-      <pc:sldChg chg="modSp">
-        <pc:chgData name="Marcia Moraes" userId="c9c67e8a-58e2-4733-9a1c-5d44fec4775b" providerId="ADAL" clId="{4BE1F46D-BD39-4FB2-BFD3-A643AA3399CF}" dt="2023-04-18T23:33:09.724" v="107" actId="14100"/>
-        <pc:sldMkLst>
-          <pc:docMk/>
-          <pc:sldMk cId="138825677" sldId="257"/>
-        </pc:sldMkLst>
-        <pc:spChg chg="mod">
-          <ac:chgData name="Marcia Moraes" userId="c9c67e8a-58e2-4733-9a1c-5d44fec4775b" providerId="ADAL" clId="{4BE1F46D-BD39-4FB2-BFD3-A643AA3399CF}" dt="2023-04-18T23:29:50.075" v="89" actId="1076"/>
-          <ac:spMkLst>
-            <pc:docMk/>
-            <pc:sldMk cId="138825677" sldId="257"/>
-            <ac:spMk id="5" creationId="{0CBF81F3-62B5-0C4D-AEA3-A1D4C0495855}"/>
-          </ac:spMkLst>
-        </pc:spChg>
-        <pc:spChg chg="mod">
-          <ac:chgData name="Marcia Moraes" userId="c9c67e8a-58e2-4733-9a1c-5d44fec4775b" providerId="ADAL" clId="{4BE1F46D-BD39-4FB2-BFD3-A643AA3399CF}" dt="2023-04-18T23:30:18.922" v="95" actId="1076"/>
-          <ac:spMkLst>
-            <pc:docMk/>
-            <pc:sldMk cId="138825677" sldId="257"/>
-            <ac:spMk id="20" creationId="{7F3BB992-9F16-1244-BEB0-DFB94CF847B9}"/>
-          </ac:spMkLst>
-        </pc:spChg>
-        <pc:spChg chg="mod">
-          <ac:chgData name="Marcia Moraes" userId="c9c67e8a-58e2-4733-9a1c-5d44fec4775b" providerId="ADAL" clId="{4BE1F46D-BD39-4FB2-BFD3-A643AA3399CF}" dt="2023-04-18T23:30:18.922" v="95" actId="1076"/>
-          <ac:spMkLst>
-            <pc:docMk/>
-            <pc:sldMk cId="138825677" sldId="257"/>
-            <ac:spMk id="21" creationId="{69DC121D-1262-0C4C-BD39-8585A006F9A3}"/>
-          </ac:spMkLst>
-        </pc:spChg>
-        <pc:spChg chg="mod">
-          <ac:chgData name="Marcia Moraes" userId="c9c67e8a-58e2-4733-9a1c-5d44fec4775b" providerId="ADAL" clId="{4BE1F46D-BD39-4FB2-BFD3-A643AA3399CF}" dt="2023-04-18T23:30:18.922" v="95" actId="1076"/>
-          <ac:spMkLst>
-            <pc:docMk/>
-            <pc:sldMk cId="138825677" sldId="257"/>
-            <ac:spMk id="22" creationId="{35916AEA-C419-F74C-AA83-17D28ACC14A7}"/>
-          </ac:spMkLst>
-        </pc:spChg>
-        <pc:spChg chg="mod">
-          <ac:chgData name="Marcia Moraes" userId="c9c67e8a-58e2-4733-9a1c-5d44fec4775b" providerId="ADAL" clId="{4BE1F46D-BD39-4FB2-BFD3-A643AA3399CF}" dt="2023-04-18T23:30:18.922" v="95" actId="1076"/>
-          <ac:spMkLst>
-            <pc:docMk/>
-            <pc:sldMk cId="138825677" sldId="257"/>
-            <ac:spMk id="23" creationId="{EC64F917-147F-0747-A772-78C5BC3C2FE1}"/>
-          </ac:spMkLst>
-        </pc:spChg>
-        <pc:spChg chg="mod">
-          <ac:chgData name="Marcia Moraes" userId="c9c67e8a-58e2-4733-9a1c-5d44fec4775b" providerId="ADAL" clId="{4BE1F46D-BD39-4FB2-BFD3-A643AA3399CF}" dt="2023-04-18T23:30:18.922" v="95" actId="1076"/>
-          <ac:spMkLst>
-            <pc:docMk/>
-            <pc:sldMk cId="138825677" sldId="257"/>
-            <ac:spMk id="24" creationId="{44472B7B-FEBF-124C-AFB6-66EBD72ADCD8}"/>
-          </ac:spMkLst>
-        </pc:spChg>
-        <pc:spChg chg="mod">
-          <ac:chgData name="Marcia Moraes" userId="c9c67e8a-58e2-4733-9a1c-5d44fec4775b" providerId="ADAL" clId="{4BE1F46D-BD39-4FB2-BFD3-A643AA3399CF}" dt="2023-04-18T23:30:18.922" v="95" actId="1076"/>
-          <ac:spMkLst>
-            <pc:docMk/>
-            <pc:sldMk cId="138825677" sldId="257"/>
-            <ac:spMk id="25" creationId="{6E7C620B-4139-FC41-B8E9-B6B3B5FDE3C8}"/>
-          </ac:spMkLst>
-        </pc:spChg>
-        <pc:spChg chg="mod">
-          <ac:chgData name="Marcia Moraes" userId="c9c67e8a-58e2-4733-9a1c-5d44fec4775b" providerId="ADAL" clId="{4BE1F46D-BD39-4FB2-BFD3-A643AA3399CF}" dt="2023-04-18T23:30:18.922" v="95" actId="1076"/>
-          <ac:spMkLst>
-            <pc:docMk/>
-            <pc:sldMk cId="138825677" sldId="257"/>
-            <ac:spMk id="26" creationId="{E6C75909-3BBE-8843-B56E-F790FE68E76B}"/>
-          </ac:spMkLst>
-        </pc:spChg>
-        <pc:spChg chg="mod">
-          <ac:chgData name="Marcia Moraes" userId="c9c67e8a-58e2-4733-9a1c-5d44fec4775b" providerId="ADAL" clId="{4BE1F46D-BD39-4FB2-BFD3-A643AA3399CF}" dt="2023-04-18T23:30:18.922" v="95" actId="1076"/>
-          <ac:spMkLst>
-            <pc:docMk/>
-            <pc:sldMk cId="138825677" sldId="257"/>
-            <ac:spMk id="27" creationId="{7FA956D0-A97E-A141-892C-16918DC36A8A}"/>
-          </ac:spMkLst>
-        </pc:spChg>
-        <pc:spChg chg="mod">
-          <ac:chgData name="Marcia Moraes" userId="c9c67e8a-58e2-4733-9a1c-5d44fec4775b" providerId="ADAL" clId="{4BE1F46D-BD39-4FB2-BFD3-A643AA3399CF}" dt="2023-04-18T23:30:18.922" v="95" actId="1076"/>
-          <ac:spMkLst>
-            <pc:docMk/>
-            <pc:sldMk cId="138825677" sldId="257"/>
-            <ac:spMk id="28" creationId="{D6FE681C-F049-3C4C-BEC4-AD45BB16AB6C}"/>
-          </ac:spMkLst>
-        </pc:spChg>
-        <pc:spChg chg="mod">
-          <ac:chgData name="Marcia Moraes" userId="c9c67e8a-58e2-4733-9a1c-5d44fec4775b" providerId="ADAL" clId="{4BE1F46D-BD39-4FB2-BFD3-A643AA3399CF}" dt="2023-04-18T23:33:09.724" v="107" actId="14100"/>
-          <ac:spMkLst>
-            <pc:docMk/>
-            <pc:sldMk cId="138825677" sldId="257"/>
-            <ac:spMk id="29" creationId="{7B57308A-DB0D-D843-93ED-85D5D0620547}"/>
-          </ac:spMkLst>
-        </pc:spChg>
-        <pc:spChg chg="mod">
-          <ac:chgData name="Marcia Moraes" userId="c9c67e8a-58e2-4733-9a1c-5d44fec4775b" providerId="ADAL" clId="{4BE1F46D-BD39-4FB2-BFD3-A643AA3399CF}" dt="2023-04-18T23:30:47.645" v="105" actId="20577"/>
-          <ac:spMkLst>
-            <pc:docMk/>
-            <pc:sldMk cId="138825677" sldId="257"/>
-            <ac:spMk id="30" creationId="{32ECFFC1-0C21-D44C-B9FC-3FD74DFCFC0A}"/>
-          </ac:spMkLst>
-        </pc:spChg>
-        <pc:spChg chg="mod">
-          <ac:chgData name="Marcia Moraes" userId="c9c67e8a-58e2-4733-9a1c-5d44fec4775b" providerId="ADAL" clId="{4BE1F46D-BD39-4FB2-BFD3-A643AA3399CF}" dt="2023-04-18T23:30:28.496" v="97" actId="1076"/>
-          <ac:spMkLst>
-            <pc:docMk/>
-            <pc:sldMk cId="138825677" sldId="257"/>
-            <ac:spMk id="31" creationId="{EAEDF4AD-2AA3-A14B-B93C-F8A4CB5BB06C}"/>
-          </ac:spMkLst>
-        </pc:spChg>
-        <pc:grpChg chg="mod">
-          <ac:chgData name="Marcia Moraes" userId="c9c67e8a-58e2-4733-9a1c-5d44fec4775b" providerId="ADAL" clId="{4BE1F46D-BD39-4FB2-BFD3-A643AA3399CF}" dt="2023-04-18T23:30:18.922" v="95" actId="1076"/>
-          <ac:grpSpMkLst>
-            <pc:docMk/>
-            <pc:sldMk cId="138825677" sldId="257"/>
-            <ac:grpSpMk id="6" creationId="{AE840F63-CF2C-FB4A-B331-79E1CC201A03}"/>
-          </ac:grpSpMkLst>
-        </pc:grpChg>
-      </pc:sldChg>
-      <pc:sldChg chg="addSp delSp modSp">
-        <pc:chgData name="Marcia Moraes" userId="c9c67e8a-58e2-4733-9a1c-5d44fec4775b" providerId="ADAL" clId="{4BE1F46D-BD39-4FB2-BFD3-A643AA3399CF}" dt="2023-04-18T23:44:10.378" v="124" actId="207"/>
-        <pc:sldMkLst>
-          <pc:docMk/>
-          <pc:sldMk cId="431158693" sldId="258"/>
-        </pc:sldMkLst>
-        <pc:spChg chg="mod">
-          <ac:chgData name="Marcia Moraes" userId="c9c67e8a-58e2-4733-9a1c-5d44fec4775b" providerId="ADAL" clId="{4BE1F46D-BD39-4FB2-BFD3-A643AA3399CF}" dt="2023-04-18T23:36:31.406" v="113" actId="1076"/>
-          <ac:spMkLst>
-            <pc:docMk/>
-            <pc:sldMk cId="431158693" sldId="258"/>
-            <ac:spMk id="3" creationId="{AE054FA2-8DEE-414F-A6B5-565008F4D723}"/>
-          </ac:spMkLst>
-        </pc:spChg>
-        <pc:spChg chg="add mod">
-          <ac:chgData name="Marcia Moraes" userId="c9c67e8a-58e2-4733-9a1c-5d44fec4775b" providerId="ADAL" clId="{4BE1F46D-BD39-4FB2-BFD3-A643AA3399CF}" dt="2023-04-18T23:44:10.378" v="124" actId="207"/>
-          <ac:spMkLst>
-            <pc:docMk/>
-            <pc:sldMk cId="431158693" sldId="258"/>
-            <ac:spMk id="5" creationId="{7835A8D4-7F18-4C30-AF7E-27E423968520}"/>
-          </ac:spMkLst>
-        </pc:spChg>
-        <pc:spChg chg="mod">
-          <ac:chgData name="Marcia Moraes" userId="c9c67e8a-58e2-4733-9a1c-5d44fec4775b" providerId="ADAL" clId="{4BE1F46D-BD39-4FB2-BFD3-A643AA3399CF}" dt="2023-04-18T23:36:21.075" v="111" actId="1076"/>
-          <ac:spMkLst>
-            <pc:docMk/>
-            <pc:sldMk cId="431158693" sldId="258"/>
-            <ac:spMk id="26" creationId="{1D1DAF1E-B13D-BD42-845C-7F08667AC556}"/>
-          </ac:spMkLst>
-        </pc:spChg>
-        <pc:spChg chg="del">
-          <ac:chgData name="Marcia Moraes" userId="c9c67e8a-58e2-4733-9a1c-5d44fec4775b" providerId="ADAL" clId="{4BE1F46D-BD39-4FB2-BFD3-A643AA3399CF}" dt="2023-04-18T23:36:08.384" v="108" actId="478"/>
-          <ac:spMkLst>
-            <pc:docMk/>
-            <pc:sldMk cId="431158693" sldId="258"/>
-            <ac:spMk id="28" creationId="{663B04EC-BF57-8F4B-966E-11416B37832C}"/>
-          </ac:spMkLst>
-        </pc:spChg>
-      </pc:sldChg>
-      <pc:sldChg chg="delSp modSp delAnim">
-        <pc:chgData name="Marcia Moraes" userId="c9c67e8a-58e2-4733-9a1c-5d44fec4775b" providerId="ADAL" clId="{4BE1F46D-BD39-4FB2-BFD3-A643AA3399CF}" dt="2023-04-19T00:12:20.901" v="1332" actId="20577"/>
-        <pc:sldMkLst>
-          <pc:docMk/>
-          <pc:sldMk cId="4278459446" sldId="259"/>
-        </pc:sldMkLst>
-        <pc:spChg chg="mod">
-          <ac:chgData name="Marcia Moraes" userId="c9c67e8a-58e2-4733-9a1c-5d44fec4775b" providerId="ADAL" clId="{4BE1F46D-BD39-4FB2-BFD3-A643AA3399CF}" dt="2023-04-19T00:12:20.901" v="1332" actId="20577"/>
-          <ac:spMkLst>
-            <pc:docMk/>
-            <pc:sldMk cId="4278459446" sldId="259"/>
-            <ac:spMk id="3" creationId="{13064549-29B4-EF4D-AE48-7CA8E003AA29}"/>
-          </ac:spMkLst>
-        </pc:spChg>
-        <pc:spChg chg="del">
-          <ac:chgData name="Marcia Moraes" userId="c9c67e8a-58e2-4733-9a1c-5d44fec4775b" providerId="ADAL" clId="{4BE1F46D-BD39-4FB2-BFD3-A643AA3399CF}" dt="2023-04-19T00:11:59.455" v="1293" actId="478"/>
-          <ac:spMkLst>
-            <pc:docMk/>
-            <pc:sldMk cId="4278459446" sldId="259"/>
-            <ac:spMk id="5" creationId="{B00024C9-4C3F-234F-8720-E0B428EA0529}"/>
-          </ac:spMkLst>
-        </pc:spChg>
-        <pc:spChg chg="del">
-          <ac:chgData name="Marcia Moraes" userId="c9c67e8a-58e2-4733-9a1c-5d44fec4775b" providerId="ADAL" clId="{4BE1F46D-BD39-4FB2-BFD3-A643AA3399CF}" dt="2023-04-19T00:11:59.455" v="1293" actId="478"/>
-          <ac:spMkLst>
-            <pc:docMk/>
-            <pc:sldMk cId="4278459446" sldId="259"/>
-            <ac:spMk id="6" creationId="{7003C600-3028-444D-9948-1F70E0DB1364}"/>
-          </ac:spMkLst>
-        </pc:spChg>
-        <pc:spChg chg="del">
-          <ac:chgData name="Marcia Moraes" userId="c9c67e8a-58e2-4733-9a1c-5d44fec4775b" providerId="ADAL" clId="{4BE1F46D-BD39-4FB2-BFD3-A643AA3399CF}" dt="2023-04-19T00:11:59.455" v="1293" actId="478"/>
-          <ac:spMkLst>
-            <pc:docMk/>
-            <pc:sldMk cId="4278459446" sldId="259"/>
-            <ac:spMk id="7" creationId="{850875F9-B11A-ED40-8325-A43E13AC408C}"/>
-          </ac:spMkLst>
-        </pc:spChg>
-        <pc:spChg chg="del">
-          <ac:chgData name="Marcia Moraes" userId="c9c67e8a-58e2-4733-9a1c-5d44fec4775b" providerId="ADAL" clId="{4BE1F46D-BD39-4FB2-BFD3-A643AA3399CF}" dt="2023-04-19T00:11:59.455" v="1293" actId="478"/>
-          <ac:spMkLst>
-            <pc:docMk/>
-            <pc:sldMk cId="4278459446" sldId="259"/>
-            <ac:spMk id="8" creationId="{7092ACFA-E45F-8346-BEA4-579CD8134F98}"/>
-          </ac:spMkLst>
-        </pc:spChg>
-        <pc:spChg chg="del">
-          <ac:chgData name="Marcia Moraes" userId="c9c67e8a-58e2-4733-9a1c-5d44fec4775b" providerId="ADAL" clId="{4BE1F46D-BD39-4FB2-BFD3-A643AA3399CF}" dt="2023-04-19T00:11:59.455" v="1293" actId="478"/>
-          <ac:spMkLst>
-            <pc:docMk/>
-            <pc:sldMk cId="4278459446" sldId="259"/>
-            <ac:spMk id="9" creationId="{391DA40A-8AFC-FB43-A259-CB95EAB45E26}"/>
-          </ac:spMkLst>
-        </pc:spChg>
-        <pc:spChg chg="del">
-          <ac:chgData name="Marcia Moraes" userId="c9c67e8a-58e2-4733-9a1c-5d44fec4775b" providerId="ADAL" clId="{4BE1F46D-BD39-4FB2-BFD3-A643AA3399CF}" dt="2023-04-19T00:11:59.455" v="1293" actId="478"/>
-          <ac:spMkLst>
-            <pc:docMk/>
-            <pc:sldMk cId="4278459446" sldId="259"/>
-            <ac:spMk id="10" creationId="{2B85C62E-3A0A-8041-8B92-673DA93BAC7E}"/>
-          </ac:spMkLst>
-        </pc:spChg>
-        <pc:spChg chg="del">
-          <ac:chgData name="Marcia Moraes" userId="c9c67e8a-58e2-4733-9a1c-5d44fec4775b" providerId="ADAL" clId="{4BE1F46D-BD39-4FB2-BFD3-A643AA3399CF}" dt="2023-04-19T00:11:59.455" v="1293" actId="478"/>
-          <ac:spMkLst>
-            <pc:docMk/>
-            <pc:sldMk cId="4278459446" sldId="259"/>
-            <ac:spMk id="11" creationId="{6E8E4583-041D-3F43-8244-C3C720898453}"/>
-          </ac:spMkLst>
-        </pc:spChg>
-        <pc:spChg chg="del">
-          <ac:chgData name="Marcia Moraes" userId="c9c67e8a-58e2-4733-9a1c-5d44fec4775b" providerId="ADAL" clId="{4BE1F46D-BD39-4FB2-BFD3-A643AA3399CF}" dt="2023-04-19T00:11:59.455" v="1293" actId="478"/>
-          <ac:spMkLst>
-            <pc:docMk/>
-            <pc:sldMk cId="4278459446" sldId="259"/>
-            <ac:spMk id="15" creationId="{547DEDF9-B79D-FE42-A477-B1DEB613CBD7}"/>
-          </ac:spMkLst>
-        </pc:spChg>
-        <pc:spChg chg="del">
-          <ac:chgData name="Marcia Moraes" userId="c9c67e8a-58e2-4733-9a1c-5d44fec4775b" providerId="ADAL" clId="{4BE1F46D-BD39-4FB2-BFD3-A643AA3399CF}" dt="2023-04-19T00:11:59.455" v="1293" actId="478"/>
-          <ac:spMkLst>
-            <pc:docMk/>
-            <pc:sldMk cId="4278459446" sldId="259"/>
-            <ac:spMk id="16" creationId="{08CC57AB-2CDF-0F43-9E22-0DD3D23FF03E}"/>
-          </ac:spMkLst>
-        </pc:spChg>
-        <pc:spChg chg="del">
-          <ac:chgData name="Marcia Moraes" userId="c9c67e8a-58e2-4733-9a1c-5d44fec4775b" providerId="ADAL" clId="{4BE1F46D-BD39-4FB2-BFD3-A643AA3399CF}" dt="2023-04-19T00:11:59.455" v="1293" actId="478"/>
-          <ac:spMkLst>
-            <pc:docMk/>
-            <pc:sldMk cId="4278459446" sldId="259"/>
-            <ac:spMk id="20" creationId="{40017795-E35F-024A-B4DE-D3FDEB197832}"/>
-          </ac:spMkLst>
-        </pc:spChg>
-      </pc:sldChg>
-      <pc:sldChg chg="addSp delSp modSp ord modAnim">
-        <pc:chgData name="Marcia Moraes" userId="c9c67e8a-58e2-4733-9a1c-5d44fec4775b" providerId="ADAL" clId="{4BE1F46D-BD39-4FB2-BFD3-A643AA3399CF}" dt="2023-04-19T00:32:22.280" v="1423"/>
-        <pc:sldMkLst>
-          <pc:docMk/>
-          <pc:sldMk cId="3402082627" sldId="260"/>
-        </pc:sldMkLst>
-        <pc:spChg chg="mod">
-          <ac:chgData name="Marcia Moraes" userId="c9c67e8a-58e2-4733-9a1c-5d44fec4775b" providerId="ADAL" clId="{4BE1F46D-BD39-4FB2-BFD3-A643AA3399CF}" dt="2023-04-19T00:31:21.504" v="1376" actId="1076"/>
-          <ac:spMkLst>
-            <pc:docMk/>
-            <pc:sldMk cId="3402082627" sldId="260"/>
-            <ac:spMk id="3" creationId="{311C3BA4-3905-FF48-A117-F0A9C9C69F97}"/>
-          </ac:spMkLst>
-        </pc:spChg>
-        <pc:spChg chg="add mod">
-          <ac:chgData name="Marcia Moraes" userId="c9c67e8a-58e2-4733-9a1c-5d44fec4775b" providerId="ADAL" clId="{4BE1F46D-BD39-4FB2-BFD3-A643AA3399CF}" dt="2023-04-19T00:31:57.536" v="1384" actId="20577"/>
-          <ac:spMkLst>
-            <pc:docMk/>
-            <pc:sldMk cId="3402082627" sldId="260"/>
-            <ac:spMk id="8" creationId="{FDF93C82-9499-4EF7-A4A0-564F67E84093}"/>
-          </ac:spMkLst>
-        </pc:spChg>
-        <pc:spChg chg="add mod">
-          <ac:chgData name="Marcia Moraes" userId="c9c67e8a-58e2-4733-9a1c-5d44fec4775b" providerId="ADAL" clId="{4BE1F46D-BD39-4FB2-BFD3-A643AA3399CF}" dt="2023-04-19T00:32:12.556" v="1422" actId="207"/>
-          <ac:spMkLst>
-            <pc:docMk/>
-            <pc:sldMk cId="3402082627" sldId="260"/>
-            <ac:spMk id="9" creationId="{B1B7E602-CF62-4E04-980E-51AA760E318B}"/>
-          </ac:spMkLst>
-        </pc:spChg>
-        <pc:spChg chg="del">
-          <ac:chgData name="Marcia Moraes" userId="c9c67e8a-58e2-4733-9a1c-5d44fec4775b" providerId="ADAL" clId="{4BE1F46D-BD39-4FB2-BFD3-A643AA3399CF}" dt="2023-04-19T00:19:14.472" v="1374" actId="478"/>
-          <ac:spMkLst>
-            <pc:docMk/>
-            <pc:sldMk cId="3402082627" sldId="260"/>
-            <ac:spMk id="16" creationId="{1D907B16-4953-BD4D-A2E6-997D152363FD}"/>
-          </ac:spMkLst>
-        </pc:spChg>
-      </pc:sldChg>
-      <pc:sldChg chg="ord">
-        <pc:chgData name="Marcia Moraes" userId="c9c67e8a-58e2-4733-9a1c-5d44fec4775b" providerId="ADAL" clId="{4BE1F46D-BD39-4FB2-BFD3-A643AA3399CF}" dt="2023-04-19T00:13:30.334" v="1334"/>
-        <pc:sldMkLst>
-          <pc:docMk/>
-          <pc:sldMk cId="2059576891" sldId="261"/>
-        </pc:sldMkLst>
-      </pc:sldChg>
-      <pc:sldChg chg="del">
-        <pc:chgData name="Marcia Moraes" userId="c9c67e8a-58e2-4733-9a1c-5d44fec4775b" providerId="ADAL" clId="{4BE1F46D-BD39-4FB2-BFD3-A643AA3399CF}" dt="2023-04-19T00:13:32.656" v="1335" actId="2696"/>
-        <pc:sldMkLst>
-          <pc:docMk/>
-          <pc:sldMk cId="2436844951" sldId="263"/>
-        </pc:sldMkLst>
-      </pc:sldChg>
-      <pc:sldChg chg="del">
-        <pc:chgData name="Marcia Moraes" userId="c9c67e8a-58e2-4733-9a1c-5d44fec4775b" providerId="ADAL" clId="{4BE1F46D-BD39-4FB2-BFD3-A643AA3399CF}" dt="2023-04-18T23:18:09.870" v="5" actId="2696"/>
-        <pc:sldMkLst>
-          <pc:docMk/>
-          <pc:sldMk cId="926474781" sldId="271"/>
-        </pc:sldMkLst>
-      </pc:sldChg>
-      <pc:sldChg chg="del">
-        <pc:chgData name="Marcia Moraes" userId="c9c67e8a-58e2-4733-9a1c-5d44fec4775b" providerId="ADAL" clId="{4BE1F46D-BD39-4FB2-BFD3-A643AA3399CF}" dt="2023-04-19T00:13:33.161" v="1336" actId="2696"/>
-        <pc:sldMkLst>
-          <pc:docMk/>
-          <pc:sldMk cId="1035711711" sldId="272"/>
-        </pc:sldMkLst>
-      </pc:sldChg>
-      <pc:sldChg chg="del">
-        <pc:chgData name="Marcia Moraes" userId="c9c67e8a-58e2-4733-9a1c-5d44fec4775b" providerId="ADAL" clId="{4BE1F46D-BD39-4FB2-BFD3-A643AA3399CF}" dt="2023-04-19T00:13:33.902" v="1337" actId="2696"/>
-        <pc:sldMkLst>
-          <pc:docMk/>
-          <pc:sldMk cId="3183979242" sldId="273"/>
-        </pc:sldMkLst>
-      </pc:sldChg>
-      <pc:sldChg chg="delSp modSp delAnim">
-        <pc:chgData name="Marcia Moraes" userId="c9c67e8a-58e2-4733-9a1c-5d44fec4775b" providerId="ADAL" clId="{4BE1F46D-BD39-4FB2-BFD3-A643AA3399CF}" dt="2023-04-19T00:14:04.450" v="1373" actId="478"/>
-        <pc:sldMkLst>
-          <pc:docMk/>
-          <pc:sldMk cId="1979774323" sldId="274"/>
-        </pc:sldMkLst>
-        <pc:spChg chg="mod">
-          <ac:chgData name="Marcia Moraes" userId="c9c67e8a-58e2-4733-9a1c-5d44fec4775b" providerId="ADAL" clId="{4BE1F46D-BD39-4FB2-BFD3-A643AA3399CF}" dt="2023-04-19T00:13:45.960" v="1371" actId="20577"/>
-          <ac:spMkLst>
-            <pc:docMk/>
-            <pc:sldMk cId="1979774323" sldId="274"/>
-            <ac:spMk id="2" creationId="{19F613E4-61AD-3C4B-801C-D08A6B51D9D9}"/>
-          </ac:spMkLst>
-        </pc:spChg>
-        <pc:spChg chg="del">
-          <ac:chgData name="Marcia Moraes" userId="c9c67e8a-58e2-4733-9a1c-5d44fec4775b" providerId="ADAL" clId="{4BE1F46D-BD39-4FB2-BFD3-A643AA3399CF}" dt="2023-04-19T00:14:04.450" v="1373" actId="478"/>
-          <ac:spMkLst>
-            <pc:docMk/>
-            <pc:sldMk cId="1979774323" sldId="274"/>
-            <ac:spMk id="5" creationId="{2B958510-0F2B-EE4F-BF65-527683594EC4}"/>
-          </ac:spMkLst>
-        </pc:spChg>
-        <pc:spChg chg="del">
-          <ac:chgData name="Marcia Moraes" userId="c9c67e8a-58e2-4733-9a1c-5d44fec4775b" providerId="ADAL" clId="{4BE1F46D-BD39-4FB2-BFD3-A643AA3399CF}" dt="2023-04-19T00:14:04.450" v="1373" actId="478"/>
-          <ac:spMkLst>
-            <pc:docMk/>
-            <pc:sldMk cId="1979774323" sldId="274"/>
-            <ac:spMk id="6" creationId="{1434C16A-ED46-944B-A558-855AC5BC12AB}"/>
-          </ac:spMkLst>
-        </pc:spChg>
-        <pc:spChg chg="del">
-          <ac:chgData name="Marcia Moraes" userId="c9c67e8a-58e2-4733-9a1c-5d44fec4775b" providerId="ADAL" clId="{4BE1F46D-BD39-4FB2-BFD3-A643AA3399CF}" dt="2023-04-19T00:14:04.450" v="1373" actId="478"/>
-          <ac:spMkLst>
-            <pc:docMk/>
-            <pc:sldMk cId="1979774323" sldId="274"/>
-            <ac:spMk id="7" creationId="{2E60760C-F470-A544-BE16-86A47D66D228}"/>
-          </ac:spMkLst>
-        </pc:spChg>
-        <pc:spChg chg="del">
-          <ac:chgData name="Marcia Moraes" userId="c9c67e8a-58e2-4733-9a1c-5d44fec4775b" providerId="ADAL" clId="{4BE1F46D-BD39-4FB2-BFD3-A643AA3399CF}" dt="2023-04-19T00:14:04.450" v="1373" actId="478"/>
-          <ac:spMkLst>
-            <pc:docMk/>
-            <pc:sldMk cId="1979774323" sldId="274"/>
-            <ac:spMk id="8" creationId="{53D5B0F2-2DA9-6840-85B7-22700D70E0A5}"/>
-          </ac:spMkLst>
-        </pc:spChg>
-      </pc:sldChg>
-      <pc:sldChg chg="delSp del">
-        <pc:chgData name="Marcia Moraes" userId="c9c67e8a-58e2-4733-9a1c-5d44fec4775b" providerId="ADAL" clId="{4BE1F46D-BD39-4FB2-BFD3-A643AA3399CF}" dt="2023-04-18T23:18:08.954" v="4" actId="2696"/>
-        <pc:sldMkLst>
-          <pc:docMk/>
-          <pc:sldMk cId="2571368551" sldId="275"/>
-        </pc:sldMkLst>
-        <pc:spChg chg="del">
-          <ac:chgData name="Marcia Moraes" userId="c9c67e8a-58e2-4733-9a1c-5d44fec4775b" providerId="ADAL" clId="{4BE1F46D-BD39-4FB2-BFD3-A643AA3399CF}" dt="2023-04-18T23:17:45.961" v="0"/>
-          <ac:spMkLst>
-            <pc:docMk/>
-            <pc:sldMk cId="2571368551" sldId="275"/>
-            <ac:spMk id="5" creationId="{1E54CBCD-3447-4F03-970A-F1628F46BEF2}"/>
-          </ac:spMkLst>
-        </pc:spChg>
-      </pc:sldChg>
-      <pc:sldChg chg="addSp delSp modSp">
-        <pc:chgData name="Marcia Moraes" userId="c9c67e8a-58e2-4733-9a1c-5d44fec4775b" providerId="ADAL" clId="{4BE1F46D-BD39-4FB2-BFD3-A643AA3399CF}" dt="2023-04-18T23:24:23.486" v="20" actId="478"/>
+      <pc:sldChg chg="addSp delSp">
+        <pc:chgData name="Marcia Moraes" userId="c9c67e8a-58e2-4733-9a1c-5d44fec4775b" providerId="ADAL" clId="{E8878AFF-4F97-4DE5-B01D-2357D9320942}" dt="2023-11-12T18:49:47" v="1"/>
         <pc:sldMkLst>
           <pc:docMk/>
           <pc:sldMk cId="3839129108" sldId="276"/>
         </pc:sldMkLst>
-        <pc:spChg chg="del mod">
-          <ac:chgData name="Marcia Moraes" userId="c9c67e8a-58e2-4733-9a1c-5d44fec4775b" providerId="ADAL" clId="{4BE1F46D-BD39-4FB2-BFD3-A643AA3399CF}" dt="2023-04-18T23:24:23.486" v="20" actId="478"/>
+        <pc:spChg chg="add">
+          <ac:chgData name="Marcia Moraes" userId="c9c67e8a-58e2-4733-9a1c-5d44fec4775b" providerId="ADAL" clId="{E8878AFF-4F97-4DE5-B01D-2357D9320942}" dt="2023-11-12T18:49:47" v="1"/>
           <ac:spMkLst>
             <pc:docMk/>
             <pc:sldMk cId="3839129108" sldId="276"/>
-            <ac:spMk id="2" creationId="{84CD52E7-9878-46B0-B322-12FDC9581986}"/>
+            <ac:spMk id="6" creationId="{C3B1675F-E90D-490B-9E5C-E88AF1B9997D}"/>
           </ac:spMkLst>
         </pc:spChg>
         <pc:spChg chg="del">
-          <ac:chgData name="Marcia Moraes" userId="c9c67e8a-58e2-4733-9a1c-5d44fec4775b" providerId="ADAL" clId="{4BE1F46D-BD39-4FB2-BFD3-A643AA3399CF}" dt="2023-04-18T23:17:51.092" v="1" actId="478"/>
-          <ac:spMkLst>
-            <pc:docMk/>
-            <pc:sldMk cId="3839129108" sldId="276"/>
-            <ac:spMk id="5" creationId="{1E54CBCD-3447-4F03-970A-F1628F46BEF2}"/>
-          </ac:spMkLst>
-        </pc:spChg>
-        <pc:spChg chg="add">
-          <ac:chgData name="Marcia Moraes" userId="c9c67e8a-58e2-4733-9a1c-5d44fec4775b" providerId="ADAL" clId="{4BE1F46D-BD39-4FB2-BFD3-A643AA3399CF}" dt="2023-04-18T23:17:51.682" v="2"/>
+          <ac:chgData name="Marcia Moraes" userId="c9c67e8a-58e2-4733-9a1c-5d44fec4775b" providerId="ADAL" clId="{E8878AFF-4F97-4DE5-B01D-2357D9320942}" dt="2023-11-12T18:49:07.288" v="0" actId="478"/>
           <ac:spMkLst>
             <pc:docMk/>
             <pc:sldMk cId="3839129108" sldId="276"/>
             <ac:spMk id="7" creationId="{C9405FC4-CFB5-49B7-A6B0-52135B2A1A1F}"/>
           </ac:spMkLst>
         </pc:spChg>
-        <pc:spChg chg="mod">
-          <ac:chgData name="Marcia Moraes" userId="c9c67e8a-58e2-4733-9a1c-5d44fec4775b" providerId="ADAL" clId="{4BE1F46D-BD39-4FB2-BFD3-A643AA3399CF}" dt="2023-04-18T23:18:02.005" v="3"/>
-          <ac:spMkLst>
+        <pc:graphicFrameChg chg="add">
+          <ac:chgData name="Marcia Moraes" userId="c9c67e8a-58e2-4733-9a1c-5d44fec4775b" providerId="ADAL" clId="{E8878AFF-4F97-4DE5-B01D-2357D9320942}" dt="2023-11-12T18:49:47" v="1"/>
+          <ac:graphicFrameMkLst>
             <pc:docMk/>
             <pc:sldMk cId="3839129108" sldId="276"/>
-            <ac:spMk id="11" creationId="{BDA0DBC1-29A7-4498-B9AA-9B174D0FEC3E}"/>
-          </ac:spMkLst>
-        </pc:spChg>
-        <pc:picChg chg="add mod">
-          <ac:chgData name="Marcia Moraes" userId="c9c67e8a-58e2-4733-9a1c-5d44fec4775b" providerId="ADAL" clId="{4BE1F46D-BD39-4FB2-BFD3-A643AA3399CF}" dt="2023-04-18T23:21:30.445" v="19" actId="1076"/>
-          <ac:picMkLst>
-            <pc:docMk/>
-            <pc:sldMk cId="3839129108" sldId="276"/>
-            <ac:picMk id="3" creationId="{8C9890E6-F5A6-4633-A094-5CA51042BD91}"/>
-          </ac:picMkLst>
-        </pc:picChg>
-        <pc:picChg chg="del">
-          <ac:chgData name="Marcia Moraes" userId="c9c67e8a-58e2-4733-9a1c-5d44fec4775b" providerId="ADAL" clId="{4BE1F46D-BD39-4FB2-BFD3-A643AA3399CF}" dt="2023-04-18T23:21:13.096" v="13" actId="478"/>
-          <ac:picMkLst>
-            <pc:docMk/>
-            <pc:sldMk cId="3839129108" sldId="276"/>
-            <ac:picMk id="1026" creationId="{7582B245-47AB-4C06-B05E-2204AB28160C}"/>
-          </ac:picMkLst>
-        </pc:picChg>
+            <ac:graphicFrameMk id="8" creationId="{D7C43544-FAC7-4A43-B862-E29575CC96BC}"/>
+          </ac:graphicFrameMkLst>
+        </pc:graphicFrameChg>
       </pc:sldChg>
-      <pc:sldChg chg="addSp delSp modSp add ord delAnim modAnim">
-        <pc:chgData name="Marcia Moraes" userId="c9c67e8a-58e2-4733-9a1c-5d44fec4775b" providerId="ADAL" clId="{4BE1F46D-BD39-4FB2-BFD3-A643AA3399CF}" dt="2023-04-18T23:50:34.631" v="810"/>
-        <pc:sldMkLst>
-          <pc:docMk/>
-          <pc:sldMk cId="1303175340" sldId="277"/>
-        </pc:sldMkLst>
-        <pc:spChg chg="mod">
-          <ac:chgData name="Marcia Moraes" userId="c9c67e8a-58e2-4733-9a1c-5d44fec4775b" providerId="ADAL" clId="{4BE1F46D-BD39-4FB2-BFD3-A643AA3399CF}" dt="2023-04-18T23:46:45.650" v="369" actId="20577"/>
-          <ac:spMkLst>
-            <pc:docMk/>
-            <pc:sldMk cId="1303175340" sldId="277"/>
-            <ac:spMk id="3" creationId="{AE054FA2-8DEE-414F-A6B5-565008F4D723}"/>
-          </ac:spMkLst>
-        </pc:spChg>
-        <pc:spChg chg="del mod">
-          <ac:chgData name="Marcia Moraes" userId="c9c67e8a-58e2-4733-9a1c-5d44fec4775b" providerId="ADAL" clId="{4BE1F46D-BD39-4FB2-BFD3-A643AA3399CF}" dt="2023-04-18T23:45:28.523" v="160" actId="478"/>
-          <ac:spMkLst>
-            <pc:docMk/>
-            <pc:sldMk cId="1303175340" sldId="277"/>
-            <ac:spMk id="5" creationId="{7835A8D4-7F18-4C30-AF7E-27E423968520}"/>
-          </ac:spMkLst>
-        </pc:spChg>
-        <pc:spChg chg="del">
-          <ac:chgData name="Marcia Moraes" userId="c9c67e8a-58e2-4733-9a1c-5d44fec4775b" providerId="ADAL" clId="{4BE1F46D-BD39-4FB2-BFD3-A643AA3399CF}" dt="2023-04-18T23:46:23.704" v="303" actId="478"/>
-          <ac:spMkLst>
-            <pc:docMk/>
-            <pc:sldMk cId="1303175340" sldId="277"/>
-            <ac:spMk id="19" creationId="{0CFFFB20-9C03-3C4E-8FBB-8541B2132F47}"/>
-          </ac:spMkLst>
-        </pc:spChg>
-        <pc:spChg chg="del">
-          <ac:chgData name="Marcia Moraes" userId="c9c67e8a-58e2-4733-9a1c-5d44fec4775b" providerId="ADAL" clId="{4BE1F46D-BD39-4FB2-BFD3-A643AA3399CF}" dt="2023-04-18T23:46:23.704" v="303" actId="478"/>
-          <ac:spMkLst>
-            <pc:docMk/>
-            <pc:sldMk cId="1303175340" sldId="277"/>
-            <ac:spMk id="20" creationId="{E0CCACE1-8470-A045-ACA9-E54CD842D50E}"/>
-          </ac:spMkLst>
-        </pc:spChg>
-        <pc:spChg chg="del">
-          <ac:chgData name="Marcia Moraes" userId="c9c67e8a-58e2-4733-9a1c-5d44fec4775b" providerId="ADAL" clId="{4BE1F46D-BD39-4FB2-BFD3-A643AA3399CF}" dt="2023-04-18T23:46:23.704" v="303" actId="478"/>
-          <ac:spMkLst>
-            <pc:docMk/>
-            <pc:sldMk cId="1303175340" sldId="277"/>
-            <ac:spMk id="21" creationId="{E26436B3-0664-D24D-9C2D-8CC44FA50443}"/>
-          </ac:spMkLst>
-        </pc:spChg>
-        <pc:spChg chg="del">
-          <ac:chgData name="Marcia Moraes" userId="c9c67e8a-58e2-4733-9a1c-5d44fec4775b" providerId="ADAL" clId="{4BE1F46D-BD39-4FB2-BFD3-A643AA3399CF}" dt="2023-04-18T23:46:23.704" v="303" actId="478"/>
-          <ac:spMkLst>
-            <pc:docMk/>
-            <pc:sldMk cId="1303175340" sldId="277"/>
-            <ac:spMk id="22" creationId="{C221BF84-52C3-284C-A37B-71E6969317AD}"/>
-          </ac:spMkLst>
-        </pc:spChg>
-        <pc:spChg chg="del">
-          <ac:chgData name="Marcia Moraes" userId="c9c67e8a-58e2-4733-9a1c-5d44fec4775b" providerId="ADAL" clId="{4BE1F46D-BD39-4FB2-BFD3-A643AA3399CF}" dt="2023-04-18T23:46:23.704" v="303" actId="478"/>
-          <ac:spMkLst>
-            <pc:docMk/>
-            <pc:sldMk cId="1303175340" sldId="277"/>
-            <ac:spMk id="23" creationId="{59211422-ECE6-8A4C-8F19-CDF8E20CA956}"/>
-          </ac:spMkLst>
-        </pc:spChg>
-        <pc:spChg chg="del">
-          <ac:chgData name="Marcia Moraes" userId="c9c67e8a-58e2-4733-9a1c-5d44fec4775b" providerId="ADAL" clId="{4BE1F46D-BD39-4FB2-BFD3-A643AA3399CF}" dt="2023-04-18T23:46:23.704" v="303" actId="478"/>
-          <ac:spMkLst>
-            <pc:docMk/>
-            <pc:sldMk cId="1303175340" sldId="277"/>
-            <ac:spMk id="24" creationId="{F6688E60-0F79-5541-8C29-7FA57DC1A1FC}"/>
-          </ac:spMkLst>
-        </pc:spChg>
-        <pc:spChg chg="del">
-          <ac:chgData name="Marcia Moraes" userId="c9c67e8a-58e2-4733-9a1c-5d44fec4775b" providerId="ADAL" clId="{4BE1F46D-BD39-4FB2-BFD3-A643AA3399CF}" dt="2023-04-18T23:46:23.704" v="303" actId="478"/>
-          <ac:spMkLst>
-            <pc:docMk/>
-            <pc:sldMk cId="1303175340" sldId="277"/>
-            <ac:spMk id="25" creationId="{CC182BF7-A14E-0A44-A08A-8BA0C5990CEA}"/>
-          </ac:spMkLst>
-        </pc:spChg>
-        <pc:spChg chg="del">
-          <ac:chgData name="Marcia Moraes" userId="c9c67e8a-58e2-4733-9a1c-5d44fec4775b" providerId="ADAL" clId="{4BE1F46D-BD39-4FB2-BFD3-A643AA3399CF}" dt="2023-04-18T23:45:22.972" v="158" actId="478"/>
-          <ac:spMkLst>
-            <pc:docMk/>
-            <pc:sldMk cId="1303175340" sldId="277"/>
-            <ac:spMk id="26" creationId="{1D1DAF1E-B13D-BD42-845C-7F08667AC556}"/>
-          </ac:spMkLst>
-        </pc:spChg>
-        <pc:spChg chg="add mod">
-          <ac:chgData name="Marcia Moraes" userId="c9c67e8a-58e2-4733-9a1c-5d44fec4775b" providerId="ADAL" clId="{4BE1F46D-BD39-4FB2-BFD3-A643AA3399CF}" dt="2023-04-18T23:49:28.456" v="808" actId="207"/>
-          <ac:spMkLst>
-            <pc:docMk/>
-            <pc:sldMk cId="1303175340" sldId="277"/>
-            <ac:spMk id="28" creationId="{FDF686C4-75B4-48E7-B366-21EC2A3F268F}"/>
-          </ac:spMkLst>
-        </pc:spChg>
-        <pc:grpChg chg="del">
-          <ac:chgData name="Marcia Moraes" userId="c9c67e8a-58e2-4733-9a1c-5d44fec4775b" providerId="ADAL" clId="{4BE1F46D-BD39-4FB2-BFD3-A643AA3399CF}" dt="2023-04-18T23:46:23.704" v="303" actId="478"/>
-          <ac:grpSpMkLst>
-            <pc:docMk/>
-            <pc:sldMk cId="1303175340" sldId="277"/>
-            <ac:grpSpMk id="4" creationId="{FD2337F0-3EB4-CD4A-9117-E699F46F1E2E}"/>
-          </ac:grpSpMkLst>
-        </pc:grpChg>
-      </pc:sldChg>
-      <pc:sldChg chg="addSp delSp modSp add delAnim modAnim">
-        <pc:chgData name="Marcia Moraes" userId="c9c67e8a-58e2-4733-9a1c-5d44fec4775b" providerId="ADAL" clId="{4BE1F46D-BD39-4FB2-BFD3-A643AA3399CF}" dt="2023-04-18T23:56:01.611" v="1244" actId="20577"/>
-        <pc:sldMkLst>
-          <pc:docMk/>
-          <pc:sldMk cId="2582025029" sldId="278"/>
-        </pc:sldMkLst>
-        <pc:spChg chg="mod">
-          <ac:chgData name="Marcia Moraes" userId="c9c67e8a-58e2-4733-9a1c-5d44fec4775b" providerId="ADAL" clId="{4BE1F46D-BD39-4FB2-BFD3-A643AA3399CF}" dt="2023-04-18T23:56:01.611" v="1244" actId="20577"/>
-          <ac:spMkLst>
-            <pc:docMk/>
-            <pc:sldMk cId="2582025029" sldId="278"/>
-            <ac:spMk id="3" creationId="{AE054FA2-8DEE-414F-A6B5-565008F4D723}"/>
-          </ac:spMkLst>
-        </pc:spChg>
-        <pc:spChg chg="add mod">
-          <ac:chgData name="Marcia Moraes" userId="c9c67e8a-58e2-4733-9a1c-5d44fec4775b" providerId="ADAL" clId="{4BE1F46D-BD39-4FB2-BFD3-A643AA3399CF}" dt="2023-04-18T23:55:31.657" v="1156" actId="1076"/>
-          <ac:spMkLst>
-            <pc:docMk/>
-            <pc:sldMk cId="2582025029" sldId="278"/>
-            <ac:spMk id="6" creationId="{A34C9EDC-C41F-4307-A4EA-1C7FB326B49B}"/>
-          </ac:spMkLst>
-        </pc:spChg>
-        <pc:spChg chg="del">
-          <ac:chgData name="Marcia Moraes" userId="c9c67e8a-58e2-4733-9a1c-5d44fec4775b" providerId="ADAL" clId="{4BE1F46D-BD39-4FB2-BFD3-A643AA3399CF}" dt="2023-04-18T23:51:40.888" v="812" actId="478"/>
-          <ac:spMkLst>
-            <pc:docMk/>
-            <pc:sldMk cId="2582025029" sldId="278"/>
-            <ac:spMk id="28" creationId="{FDF686C4-75B4-48E7-B366-21EC2A3F268F}"/>
-          </ac:spMkLst>
-        </pc:spChg>
-      </pc:sldChg>
-      <pc:sldChg chg="addSp delSp modSp add ord">
-        <pc:chgData name="Marcia Moraes" userId="c9c67e8a-58e2-4733-9a1c-5d44fec4775b" providerId="ADAL" clId="{4BE1F46D-BD39-4FB2-BFD3-A643AA3399CF}" dt="2023-04-19T00:07:51.162" v="1288"/>
-        <pc:sldMkLst>
-          <pc:docMk/>
-          <pc:sldMk cId="1228758429" sldId="279"/>
-        </pc:sldMkLst>
-        <pc:spChg chg="mod">
-          <ac:chgData name="Marcia Moraes" userId="c9c67e8a-58e2-4733-9a1c-5d44fec4775b" providerId="ADAL" clId="{4BE1F46D-BD39-4FB2-BFD3-A643AA3399CF}" dt="2023-04-19T00:03:53.011" v="1287" actId="6549"/>
-          <ac:spMkLst>
-            <pc:docMk/>
-            <pc:sldMk cId="1228758429" sldId="279"/>
-            <ac:spMk id="3" creationId="{13064549-29B4-EF4D-AE48-7CA8E003AA29}"/>
-          </ac:spMkLst>
-        </pc:spChg>
-        <pc:spChg chg="mod">
-          <ac:chgData name="Marcia Moraes" userId="c9c67e8a-58e2-4733-9a1c-5d44fec4775b" providerId="ADAL" clId="{4BE1F46D-BD39-4FB2-BFD3-A643AA3399CF}" dt="2023-04-19T00:02:25.309" v="1256" actId="1076"/>
-          <ac:spMkLst>
-            <pc:docMk/>
-            <pc:sldMk cId="1228758429" sldId="279"/>
-            <ac:spMk id="5" creationId="{B00024C9-4C3F-234F-8720-E0B428EA0529}"/>
-          </ac:spMkLst>
-        </pc:spChg>
-        <pc:spChg chg="mod">
-          <ac:chgData name="Marcia Moraes" userId="c9c67e8a-58e2-4733-9a1c-5d44fec4775b" providerId="ADAL" clId="{4BE1F46D-BD39-4FB2-BFD3-A643AA3399CF}" dt="2023-04-19T00:02:25.309" v="1256" actId="1076"/>
-          <ac:spMkLst>
-            <pc:docMk/>
-            <pc:sldMk cId="1228758429" sldId="279"/>
-            <ac:spMk id="6" creationId="{7003C600-3028-444D-9948-1F70E0DB1364}"/>
-          </ac:spMkLst>
-        </pc:spChg>
-        <pc:spChg chg="mod">
-          <ac:chgData name="Marcia Moraes" userId="c9c67e8a-58e2-4733-9a1c-5d44fec4775b" providerId="ADAL" clId="{4BE1F46D-BD39-4FB2-BFD3-A643AA3399CF}" dt="2023-04-19T00:02:25.309" v="1256" actId="1076"/>
-          <ac:spMkLst>
-            <pc:docMk/>
-            <pc:sldMk cId="1228758429" sldId="279"/>
-            <ac:spMk id="7" creationId="{850875F9-B11A-ED40-8325-A43E13AC408C}"/>
-          </ac:spMkLst>
-        </pc:spChg>
-        <pc:spChg chg="mod">
-          <ac:chgData name="Marcia Moraes" userId="c9c67e8a-58e2-4733-9a1c-5d44fec4775b" providerId="ADAL" clId="{4BE1F46D-BD39-4FB2-BFD3-A643AA3399CF}" dt="2023-04-19T00:02:25.309" v="1256" actId="1076"/>
-          <ac:spMkLst>
-            <pc:docMk/>
-            <pc:sldMk cId="1228758429" sldId="279"/>
-            <ac:spMk id="8" creationId="{7092ACFA-E45F-8346-BEA4-579CD8134F98}"/>
-          </ac:spMkLst>
-        </pc:spChg>
-        <pc:spChg chg="mod">
-          <ac:chgData name="Marcia Moraes" userId="c9c67e8a-58e2-4733-9a1c-5d44fec4775b" providerId="ADAL" clId="{4BE1F46D-BD39-4FB2-BFD3-A643AA3399CF}" dt="2023-04-19T00:02:25.309" v="1256" actId="1076"/>
-          <ac:spMkLst>
-            <pc:docMk/>
-            <pc:sldMk cId="1228758429" sldId="279"/>
-            <ac:spMk id="9" creationId="{391DA40A-8AFC-FB43-A259-CB95EAB45E26}"/>
-          </ac:spMkLst>
-        </pc:spChg>
-        <pc:spChg chg="mod">
-          <ac:chgData name="Marcia Moraes" userId="c9c67e8a-58e2-4733-9a1c-5d44fec4775b" providerId="ADAL" clId="{4BE1F46D-BD39-4FB2-BFD3-A643AA3399CF}" dt="2023-04-19T00:02:25.309" v="1256" actId="1076"/>
-          <ac:spMkLst>
-            <pc:docMk/>
-            <pc:sldMk cId="1228758429" sldId="279"/>
-            <ac:spMk id="10" creationId="{2B85C62E-3A0A-8041-8B92-673DA93BAC7E}"/>
-          </ac:spMkLst>
-        </pc:spChg>
-        <pc:spChg chg="mod">
-          <ac:chgData name="Marcia Moraes" userId="c9c67e8a-58e2-4733-9a1c-5d44fec4775b" providerId="ADAL" clId="{4BE1F46D-BD39-4FB2-BFD3-A643AA3399CF}" dt="2023-04-19T00:02:25.309" v="1256" actId="1076"/>
-          <ac:spMkLst>
-            <pc:docMk/>
-            <pc:sldMk cId="1228758429" sldId="279"/>
-            <ac:spMk id="11" creationId="{6E8E4583-041D-3F43-8244-C3C720898453}"/>
-          </ac:spMkLst>
-        </pc:spChg>
-        <pc:spChg chg="add del">
-          <ac:chgData name="Marcia Moraes" userId="c9c67e8a-58e2-4733-9a1c-5d44fec4775b" providerId="ADAL" clId="{4BE1F46D-BD39-4FB2-BFD3-A643AA3399CF}" dt="2023-04-19T00:03:18.959" v="1271"/>
-          <ac:spMkLst>
-            <pc:docMk/>
-            <pc:sldMk cId="1228758429" sldId="279"/>
-            <ac:spMk id="12" creationId="{9C5263BC-7192-44CA-BBFF-C991A8FE0C65}"/>
-          </ac:spMkLst>
-        </pc:spChg>
-        <pc:spChg chg="mod">
-          <ac:chgData name="Marcia Moraes" userId="c9c67e8a-58e2-4733-9a1c-5d44fec4775b" providerId="ADAL" clId="{4BE1F46D-BD39-4FB2-BFD3-A643AA3399CF}" dt="2023-04-19T00:02:25.309" v="1256" actId="1076"/>
-          <ac:spMkLst>
-            <pc:docMk/>
-            <pc:sldMk cId="1228758429" sldId="279"/>
-            <ac:spMk id="15" creationId="{547DEDF9-B79D-FE42-A477-B1DEB613CBD7}"/>
-          </ac:spMkLst>
-        </pc:spChg>
-        <pc:spChg chg="mod">
-          <ac:chgData name="Marcia Moraes" userId="c9c67e8a-58e2-4733-9a1c-5d44fec4775b" providerId="ADAL" clId="{4BE1F46D-BD39-4FB2-BFD3-A643AA3399CF}" dt="2023-04-19T00:02:25.309" v="1256" actId="1076"/>
-          <ac:spMkLst>
-            <pc:docMk/>
-            <pc:sldMk cId="1228758429" sldId="279"/>
-            <ac:spMk id="16" creationId="{08CC57AB-2CDF-0F43-9E22-0DD3D23FF03E}"/>
-          </ac:spMkLst>
-        </pc:spChg>
-        <pc:spChg chg="mod">
-          <ac:chgData name="Marcia Moraes" userId="c9c67e8a-58e2-4733-9a1c-5d44fec4775b" providerId="ADAL" clId="{4BE1F46D-BD39-4FB2-BFD3-A643AA3399CF}" dt="2023-04-19T00:02:25.309" v="1256" actId="1076"/>
-          <ac:spMkLst>
-            <pc:docMk/>
-            <pc:sldMk cId="1228758429" sldId="279"/>
-            <ac:spMk id="20" creationId="{40017795-E35F-024A-B4DE-D3FDEB197832}"/>
-          </ac:spMkLst>
-        </pc:spChg>
-      </pc:sldChg>
-      <pc:sldChg chg="add">
-        <pc:chgData name="Marcia Moraes" userId="c9c67e8a-58e2-4733-9a1c-5d44fec4775b" providerId="ADAL" clId="{4BE1F46D-BD39-4FB2-BFD3-A643AA3399CF}" dt="2023-04-19T00:14:00.381" v="1372"/>
-        <pc:sldMkLst>
-          <pc:docMk/>
-          <pc:sldMk cId="1759975011" sldId="280"/>
-        </pc:sldMkLst>
-      </pc:sldChg>
-      <pc:sldMasterChg chg="modSldLayout">
-        <pc:chgData name="Marcia Moraes" userId="c9c67e8a-58e2-4733-9a1c-5d44fec4775b" providerId="ADAL" clId="{4BE1F46D-BD39-4FB2-BFD3-A643AA3399CF}" dt="2023-04-18T23:19:03.888" v="11"/>
-        <pc:sldMasterMkLst>
-          <pc:docMk/>
-          <pc:sldMasterMk cId="3965733437" sldId="2147483648"/>
-        </pc:sldMasterMkLst>
-        <pc:sldLayoutChg chg="addSp delSp modSp">
-          <pc:chgData name="Marcia Moraes" userId="c9c67e8a-58e2-4733-9a1c-5d44fec4775b" providerId="ADAL" clId="{4BE1F46D-BD39-4FB2-BFD3-A643AA3399CF}" dt="2023-04-18T23:19:03.888" v="11"/>
-          <pc:sldLayoutMkLst>
-            <pc:docMk/>
-            <pc:sldMasterMk cId="3965733437" sldId="2147483648"/>
-            <pc:sldLayoutMk cId="0" sldId="2147483689"/>
-          </pc:sldLayoutMkLst>
-          <pc:spChg chg="mod">
-            <ac:chgData name="Marcia Moraes" userId="c9c67e8a-58e2-4733-9a1c-5d44fec4775b" providerId="ADAL" clId="{4BE1F46D-BD39-4FB2-BFD3-A643AA3399CF}" dt="2023-04-18T23:18:58.059" v="9" actId="1076"/>
-            <ac:spMkLst>
-              <pc:docMk/>
-              <pc:sldMasterMk cId="3965733437" sldId="2147483648"/>
-              <pc:sldLayoutMk cId="0" sldId="2147483689"/>
-              <ac:spMk id="9" creationId="{518974DB-51D0-2C49-9088-48CE2D84AB1C}"/>
-            </ac:spMkLst>
-          </pc:spChg>
-          <pc:spChg chg="del">
-            <ac:chgData name="Marcia Moraes" userId="c9c67e8a-58e2-4733-9a1c-5d44fec4775b" providerId="ADAL" clId="{4BE1F46D-BD39-4FB2-BFD3-A643AA3399CF}" dt="2023-04-18T23:19:02.647" v="10" actId="478"/>
-            <ac:spMkLst>
-              <pc:docMk/>
-              <pc:sldMasterMk cId="3965733437" sldId="2147483648"/>
-              <pc:sldLayoutMk cId="0" sldId="2147483689"/>
-              <ac:spMk id="11" creationId="{F621E987-BD36-AF48-B11C-CC4BAD65092F}"/>
-            </ac:spMkLst>
-          </pc:spChg>
-          <pc:spChg chg="add">
-            <ac:chgData name="Marcia Moraes" userId="c9c67e8a-58e2-4733-9a1c-5d44fec4775b" providerId="ADAL" clId="{4BE1F46D-BD39-4FB2-BFD3-A643AA3399CF}" dt="2023-04-18T23:19:03.888" v="11"/>
-            <ac:spMkLst>
-              <pc:docMk/>
-              <pc:sldMasterMk cId="3965733437" sldId="2147483648"/>
-              <pc:sldLayoutMk cId="0" sldId="2147483689"/>
-              <ac:spMk id="12" creationId="{F6AD7618-A9C0-4A5A-A0AD-DC2DE6DB1853}"/>
-            </ac:spMkLst>
-          </pc:spChg>
-          <pc:picChg chg="mod">
-            <ac:chgData name="Marcia Moraes" userId="c9c67e8a-58e2-4733-9a1c-5d44fec4775b" providerId="ADAL" clId="{4BE1F46D-BD39-4FB2-BFD3-A643AA3399CF}" dt="2023-04-18T23:18:54.758" v="8" actId="1076"/>
-            <ac:picMkLst>
-              <pc:docMk/>
-              <pc:sldMasterMk cId="3965733437" sldId="2147483648"/>
-              <pc:sldLayoutMk cId="0" sldId="2147483689"/>
-              <ac:picMk id="5" creationId="{00000000-0000-0000-0000-000000000000}"/>
-            </ac:picMkLst>
-          </pc:picChg>
-          <pc:picChg chg="mod">
-            <ac:chgData name="Marcia Moraes" userId="c9c67e8a-58e2-4733-9a1c-5d44fec4775b" providerId="ADAL" clId="{4BE1F46D-BD39-4FB2-BFD3-A643AA3399CF}" dt="2023-04-18T23:18:54.232" v="7" actId="1076"/>
-            <ac:picMkLst>
-              <pc:docMk/>
-              <pc:sldMasterMk cId="3965733437" sldId="2147483648"/>
-              <pc:sldLayoutMk cId="0" sldId="2147483689"/>
-              <ac:picMk id="7" creationId="{00000000-0000-0000-0000-000000000000}"/>
-            </ac:picMkLst>
-          </pc:picChg>
-        </pc:sldLayoutChg>
-      </pc:sldMasterChg>
     </pc:docChg>
   </pc:docChgLst>
 </pc:chgInfo>
@@ -1002,7 +273,7 @@
           <a:p>
             <a:fld id="{4D7E51A5-B478-1E40-8CBB-0DAA8831E99D}" type="datetimeFigureOut">
               <a:rPr lang="en-US" smtClean="0"/>
-              <a:t>4/18/2023</a:t>
+              <a:t>11/12/2023</a:t>
             </a:fld>
             <a:endParaRPr lang="en-US"/>
           </a:p>
@@ -1167,7 +438,7 @@
           <a:p>
             <a:fld id="{D0ED587F-861E-6740-9643-E3DDAE89B8D6}" type="datetimeFigureOut">
               <a:rPr lang="en-US" smtClean="0"/>
-              <a:t>4/18/2023</a:t>
+              <a:t>11/12/2023</a:t>
             </a:fld>
             <a:endParaRPr lang="en-US"/>
           </a:p>
@@ -9562,427 +8833,6 @@
           </a:p>
         </p:txBody>
       </p:sp>
-      <p:sp>
-        <p:nvSpPr>
-          <p:cNvPr id="7" name="TextBox 6">
-            <a:extLst>
-              <a:ext uri="{FF2B5EF4-FFF2-40B4-BE49-F238E27FC236}">
-                <a16:creationId xmlns:a16="http://schemas.microsoft.com/office/drawing/2014/main" id="{C9405FC4-CFB5-49B7-A6B0-52135B2A1A1F}"/>
-              </a:ext>
-            </a:extLst>
-          </p:cNvPr>
-          <p:cNvSpPr txBox="1"/>
-          <p:nvPr/>
-        </p:nvSpPr>
-        <p:spPr>
-          <a:xfrm>
-            <a:off x="10348353" y="3780234"/>
-            <a:ext cx="3352800" cy="3477875"/>
-          </a:xfrm>
-          <a:prstGeom prst="rect">
-            <a:avLst/>
-          </a:prstGeom>
-          <a:solidFill>
-            <a:schemeClr val="bg2">
-              <a:lumMod val="40000"/>
-              <a:lumOff val="60000"/>
-            </a:schemeClr>
-          </a:solidFill>
-        </p:spPr>
-        <p:txBody>
-          <a:bodyPr wrap="square" rtlCol="0">
-            <a:spAutoFit/>
-          </a:bodyPr>
-          <a:lstStyle/>
-          <a:p>
-            <a:pPr marL="0" marR="0" lvl="0" indent="0" algn="l" defTabSz="509292" rtl="0" eaLnBrk="1" fontAlgn="auto" latinLnBrk="0" hangingPunct="1">
-              <a:lnSpc>
-                <a:spcPct val="100000"/>
-              </a:lnSpc>
-              <a:spcBef>
-                <a:spcPts val="0"/>
-              </a:spcBef>
-              <a:spcAft>
-                <a:spcPts val="0"/>
-              </a:spcAft>
-              <a:buClrTx/>
-              <a:buSzTx/>
-              <a:buFontTx/>
-              <a:buNone/>
-              <a:tabLst/>
-              <a:defRPr/>
-            </a:pPr>
-            <a:r>
-              <a:rPr kumimoji="0" lang="en-US" sz="2000" b="0" i="0" u="none" strike="noStrike" kern="1200" cap="none" spc="0" normalizeH="0" baseline="0" noProof="0" dirty="0">
-                <a:ln>
-                  <a:noFill/>
-                </a:ln>
-                <a:solidFill>
-                  <a:srgbClr val="000000"/>
-                </a:solidFill>
-                <a:effectLst/>
-                <a:uLnTx/>
-                <a:uFillTx/>
-                <a:latin typeface="Arial" panose="020B0604020202020204"/>
-                <a:ea typeface="+mn-ea"/>
-                <a:cs typeface="+mn-cs"/>
-              </a:rPr>
-              <a:t>Wednesday Help Desk – </a:t>
-            </a:r>
-          </a:p>
-          <a:p>
-            <a:pPr marL="0" marR="0" lvl="0" indent="0" algn="l" defTabSz="509292" rtl="0" eaLnBrk="1" fontAlgn="auto" latinLnBrk="0" hangingPunct="1">
-              <a:lnSpc>
-                <a:spcPct val="100000"/>
-              </a:lnSpc>
-              <a:spcBef>
-                <a:spcPts val="0"/>
-              </a:spcBef>
-              <a:spcAft>
-                <a:spcPts val="0"/>
-              </a:spcAft>
-              <a:buClrTx/>
-              <a:buSzTx/>
-              <a:buFontTx/>
-              <a:buNone/>
-              <a:tabLst/>
-              <a:defRPr/>
-            </a:pPr>
-            <a:r>
-              <a:rPr kumimoji="0" lang="en-US" sz="2000" b="0" i="0" u="none" strike="noStrike" kern="1200" cap="none" spc="0" normalizeH="0" baseline="0" noProof="0" dirty="0">
-                <a:ln>
-                  <a:noFill/>
-                </a:ln>
-                <a:solidFill>
-                  <a:srgbClr val="000000"/>
-                </a:solidFill>
-                <a:effectLst/>
-                <a:uLnTx/>
-                <a:uFillTx/>
-                <a:latin typeface="Arial" panose="020B0604020202020204"/>
-                <a:ea typeface="+mn-ea"/>
-                <a:cs typeface="+mn-cs"/>
-              </a:rPr>
-              <a:t>3-4pm CSB120</a:t>
-            </a:r>
-          </a:p>
-          <a:p>
-            <a:pPr marL="0" marR="0" lvl="0" indent="0" algn="l" defTabSz="509292" rtl="0" eaLnBrk="1" fontAlgn="auto" latinLnBrk="0" hangingPunct="1">
-              <a:lnSpc>
-                <a:spcPct val="100000"/>
-              </a:lnSpc>
-              <a:spcBef>
-                <a:spcPts val="0"/>
-              </a:spcBef>
-              <a:spcAft>
-                <a:spcPts val="0"/>
-              </a:spcAft>
-              <a:buClrTx/>
-              <a:buSzTx/>
-              <a:buFontTx/>
-              <a:buNone/>
-              <a:tabLst/>
-              <a:defRPr/>
-            </a:pPr>
-            <a:endParaRPr kumimoji="0" lang="en-US" sz="2000" b="0" i="0" u="none" strike="noStrike" kern="1200" cap="none" spc="0" normalizeH="0" baseline="0" noProof="0" dirty="0">
-              <a:ln>
-                <a:noFill/>
-              </a:ln>
-              <a:solidFill>
-                <a:srgbClr val="000000"/>
-              </a:solidFill>
-              <a:effectLst/>
-              <a:uLnTx/>
-              <a:uFillTx/>
-              <a:latin typeface="Arial" panose="020B0604020202020204"/>
-              <a:ea typeface="+mn-ea"/>
-              <a:cs typeface="+mn-cs"/>
-            </a:endParaRPr>
-          </a:p>
-          <a:p>
-            <a:pPr marL="0" marR="0" lvl="0" indent="0" algn="l" defTabSz="509292" rtl="0" eaLnBrk="1" fontAlgn="auto" latinLnBrk="0" hangingPunct="1">
-              <a:lnSpc>
-                <a:spcPct val="100000"/>
-              </a:lnSpc>
-              <a:spcBef>
-                <a:spcPts val="0"/>
-              </a:spcBef>
-              <a:spcAft>
-                <a:spcPts val="0"/>
-              </a:spcAft>
-              <a:buClrTx/>
-              <a:buSzTx/>
-              <a:buFontTx/>
-              <a:buNone/>
-              <a:tabLst/>
-              <a:defRPr/>
-            </a:pPr>
-            <a:r>
-              <a:rPr kumimoji="0" lang="en-US" sz="2000" b="0" i="0" u="none" strike="noStrike" kern="1200" cap="none" spc="0" normalizeH="0" baseline="0" noProof="0" dirty="0">
-                <a:ln>
-                  <a:noFill/>
-                </a:ln>
-                <a:solidFill>
-                  <a:srgbClr val="000000"/>
-                </a:solidFill>
-                <a:effectLst/>
-                <a:uLnTx/>
-                <a:uFillTx/>
-                <a:latin typeface="Arial" panose="020B0604020202020204"/>
-                <a:ea typeface="+mn-ea"/>
-                <a:cs typeface="+mn-cs"/>
-              </a:rPr>
-              <a:t>Wednesday Help Session – </a:t>
-            </a:r>
-          </a:p>
-          <a:p>
-            <a:pPr marL="0" marR="0" lvl="0" indent="0" algn="l" defTabSz="509292" rtl="0" eaLnBrk="1" fontAlgn="auto" latinLnBrk="0" hangingPunct="1">
-              <a:lnSpc>
-                <a:spcPct val="100000"/>
-              </a:lnSpc>
-              <a:spcBef>
-                <a:spcPts val="0"/>
-              </a:spcBef>
-              <a:spcAft>
-                <a:spcPts val="0"/>
-              </a:spcAft>
-              <a:buClrTx/>
-              <a:buSzTx/>
-              <a:buFontTx/>
-              <a:buNone/>
-              <a:tabLst/>
-              <a:defRPr/>
-            </a:pPr>
-            <a:r>
-              <a:rPr kumimoji="0" lang="en-US" sz="2000" b="0" i="0" u="none" strike="noStrike" kern="1200" cap="none" spc="0" normalizeH="0" baseline="0" noProof="0" dirty="0">
-                <a:ln>
-                  <a:noFill/>
-                </a:ln>
-                <a:solidFill>
-                  <a:srgbClr val="000000"/>
-                </a:solidFill>
-                <a:effectLst/>
-                <a:uLnTx/>
-                <a:uFillTx/>
-                <a:latin typeface="Arial" panose="020B0604020202020204"/>
-                <a:ea typeface="+mn-ea"/>
-                <a:cs typeface="+mn-cs"/>
-              </a:rPr>
-              <a:t>3-4pm CSB305</a:t>
-            </a:r>
-          </a:p>
-          <a:p>
-            <a:pPr marL="0" marR="0" lvl="0" indent="0" algn="l" defTabSz="509292" rtl="0" eaLnBrk="1" fontAlgn="auto" latinLnBrk="0" hangingPunct="1">
-              <a:lnSpc>
-                <a:spcPct val="100000"/>
-              </a:lnSpc>
-              <a:spcBef>
-                <a:spcPts val="0"/>
-              </a:spcBef>
-              <a:spcAft>
-                <a:spcPts val="0"/>
-              </a:spcAft>
-              <a:buClrTx/>
-              <a:buSzTx/>
-              <a:buFontTx/>
-              <a:buNone/>
-              <a:tabLst/>
-              <a:defRPr/>
-            </a:pPr>
-            <a:endParaRPr kumimoji="0" lang="en-US" sz="2000" b="0" i="0" u="none" strike="noStrike" kern="1200" cap="none" spc="0" normalizeH="0" baseline="0" noProof="0" dirty="0">
-              <a:ln>
-                <a:noFill/>
-              </a:ln>
-              <a:solidFill>
-                <a:srgbClr val="000000"/>
-              </a:solidFill>
-              <a:effectLst/>
-              <a:uLnTx/>
-              <a:uFillTx/>
-              <a:latin typeface="Arial" panose="020B0604020202020204"/>
-              <a:ea typeface="+mn-ea"/>
-              <a:cs typeface="+mn-cs"/>
-            </a:endParaRPr>
-          </a:p>
-          <a:p>
-            <a:pPr marL="0" marR="0" lvl="0" indent="0" algn="l" defTabSz="509292" rtl="0" eaLnBrk="1" fontAlgn="auto" latinLnBrk="0" hangingPunct="1">
-              <a:lnSpc>
-                <a:spcPct val="100000"/>
-              </a:lnSpc>
-              <a:spcBef>
-                <a:spcPts val="0"/>
-              </a:spcBef>
-              <a:spcAft>
-                <a:spcPts val="0"/>
-              </a:spcAft>
-              <a:buClrTx/>
-              <a:buSzTx/>
-              <a:buFontTx/>
-              <a:buNone/>
-              <a:tabLst/>
-              <a:defRPr/>
-            </a:pPr>
-            <a:r>
-              <a:rPr kumimoji="0" lang="en-US" sz="2000" b="0" i="0" u="none" strike="noStrike" kern="1200" cap="none" spc="0" normalizeH="0" baseline="0" noProof="0" dirty="0">
-                <a:ln>
-                  <a:noFill/>
-                </a:ln>
-                <a:solidFill>
-                  <a:srgbClr val="000000"/>
-                </a:solidFill>
-                <a:effectLst/>
-                <a:uLnTx/>
-                <a:uFillTx/>
-                <a:latin typeface="Arial" panose="020B0604020202020204"/>
-                <a:ea typeface="+mn-ea"/>
-                <a:cs typeface="+mn-cs"/>
-              </a:rPr>
-              <a:t>Thursday Help Desk – </a:t>
-            </a:r>
-          </a:p>
-          <a:p>
-            <a:pPr marL="0" marR="0" lvl="0" indent="0" algn="l" defTabSz="509292" rtl="0" eaLnBrk="1" fontAlgn="auto" latinLnBrk="0" hangingPunct="1">
-              <a:lnSpc>
-                <a:spcPct val="100000"/>
-              </a:lnSpc>
-              <a:spcBef>
-                <a:spcPts val="0"/>
-              </a:spcBef>
-              <a:spcAft>
-                <a:spcPts val="0"/>
-              </a:spcAft>
-              <a:buClrTx/>
-              <a:buSzTx/>
-              <a:buFontTx/>
-              <a:buNone/>
-              <a:tabLst/>
-              <a:defRPr/>
-            </a:pPr>
-            <a:r>
-              <a:rPr kumimoji="0" lang="en-US" sz="2000" b="0" i="0" u="none" strike="noStrike" kern="1200" cap="none" spc="0" normalizeH="0" baseline="0" noProof="0" dirty="0">
-                <a:ln>
-                  <a:noFill/>
-                </a:ln>
-                <a:solidFill>
-                  <a:srgbClr val="000000"/>
-                </a:solidFill>
-                <a:effectLst/>
-                <a:uLnTx/>
-                <a:uFillTx/>
-                <a:latin typeface="Arial" panose="020B0604020202020204"/>
-                <a:ea typeface="+mn-ea"/>
-                <a:cs typeface="+mn-cs"/>
-              </a:rPr>
-              <a:t>6-8pm Teams</a:t>
-            </a:r>
-          </a:p>
-          <a:p>
-            <a:pPr marL="0" marR="0" lvl="0" indent="0" algn="l" defTabSz="509292" rtl="0" eaLnBrk="1" fontAlgn="auto" latinLnBrk="0" hangingPunct="1">
-              <a:lnSpc>
-                <a:spcPct val="100000"/>
-              </a:lnSpc>
-              <a:spcBef>
-                <a:spcPts val="0"/>
-              </a:spcBef>
-              <a:spcAft>
-                <a:spcPts val="0"/>
-              </a:spcAft>
-              <a:buClrTx/>
-              <a:buSzTx/>
-              <a:buFontTx/>
-              <a:buNone/>
-              <a:tabLst/>
-              <a:defRPr/>
-            </a:pPr>
-            <a:endParaRPr kumimoji="0" lang="en-US" sz="2000" b="0" i="0" u="none" strike="noStrike" kern="1200" cap="none" spc="0" normalizeH="0" baseline="0" noProof="0" dirty="0">
-              <a:ln>
-                <a:noFill/>
-              </a:ln>
-              <a:solidFill>
-                <a:srgbClr val="000000"/>
-              </a:solidFill>
-              <a:effectLst/>
-              <a:uLnTx/>
-              <a:uFillTx/>
-              <a:latin typeface="Arial" panose="020B0604020202020204"/>
-              <a:ea typeface="+mn-ea"/>
-              <a:cs typeface="+mn-cs"/>
-            </a:endParaRPr>
-          </a:p>
-          <a:p>
-            <a:pPr marL="0" marR="0" lvl="0" indent="0" algn="l" defTabSz="509292" rtl="0" eaLnBrk="1" fontAlgn="auto" latinLnBrk="0" hangingPunct="1">
-              <a:lnSpc>
-                <a:spcPct val="100000"/>
-              </a:lnSpc>
-              <a:spcBef>
-                <a:spcPts val="0"/>
-              </a:spcBef>
-              <a:spcAft>
-                <a:spcPts val="0"/>
-              </a:spcAft>
-              <a:buClrTx/>
-              <a:buSzTx/>
-              <a:buFontTx/>
-              <a:buNone/>
-              <a:tabLst/>
-              <a:defRPr/>
-            </a:pPr>
-            <a:r>
-              <a:rPr kumimoji="0" lang="en-US" sz="2000" b="0" i="0" u="none" strike="noStrike" kern="1200" cap="none" spc="0" normalizeH="0" baseline="0" noProof="0" dirty="0">
-                <a:ln>
-                  <a:noFill/>
-                </a:ln>
-                <a:solidFill>
-                  <a:srgbClr val="000000"/>
-                </a:solidFill>
-                <a:effectLst/>
-                <a:uLnTx/>
-                <a:uFillTx/>
-                <a:latin typeface="Arial" panose="020B0604020202020204"/>
-                <a:ea typeface="+mn-ea"/>
-                <a:cs typeface="+mn-cs"/>
-              </a:rPr>
-              <a:t>Thursday Help Session –</a:t>
-            </a:r>
-          </a:p>
-          <a:p>
-            <a:pPr marL="0" marR="0" lvl="0" indent="0" algn="l" defTabSz="509292" rtl="0" eaLnBrk="1" fontAlgn="auto" latinLnBrk="0" hangingPunct="1">
-              <a:lnSpc>
-                <a:spcPct val="100000"/>
-              </a:lnSpc>
-              <a:spcBef>
-                <a:spcPts val="0"/>
-              </a:spcBef>
-              <a:spcAft>
-                <a:spcPts val="0"/>
-              </a:spcAft>
-              <a:buClrTx/>
-              <a:buSzTx/>
-              <a:buFontTx/>
-              <a:buNone/>
-              <a:tabLst/>
-              <a:defRPr/>
-            </a:pPr>
-            <a:r>
-              <a:rPr kumimoji="0" lang="en-US" sz="2000" b="0" i="0" u="none" strike="noStrike" kern="1200" cap="none" spc="0" normalizeH="0" baseline="0" noProof="0" dirty="0">
-                <a:ln>
-                  <a:noFill/>
-                </a:ln>
-                <a:solidFill>
-                  <a:srgbClr val="000000"/>
-                </a:solidFill>
-                <a:effectLst/>
-                <a:uLnTx/>
-                <a:uFillTx/>
-                <a:latin typeface="Arial" panose="020B0604020202020204"/>
-                <a:ea typeface="+mn-ea"/>
-                <a:cs typeface="+mn-cs"/>
-              </a:rPr>
-              <a:t>3:30-4:30pm Teams </a:t>
-            </a:r>
-          </a:p>
-        </p:txBody>
-      </p:sp>
       <p:pic>
         <p:nvPicPr>
           <p:cNvPr id="3" name="Picture 2" descr="Marie Curie quote: Life is not easy for any of us. But what of that? We...">
@@ -10030,6 +8880,1439 @@
           </a:extLst>
         </p:spPr>
       </p:pic>
+      <p:sp>
+        <p:nvSpPr>
+          <p:cNvPr id="6" name="TextBox 5">
+            <a:extLst>
+              <a:ext uri="{FF2B5EF4-FFF2-40B4-BE49-F238E27FC236}">
+                <a16:creationId xmlns:a16="http://schemas.microsoft.com/office/drawing/2014/main" id="{C3B1675F-E90D-490B-9E5C-E88AF1B9997D}"/>
+              </a:ext>
+            </a:extLst>
+          </p:cNvPr>
+          <p:cNvSpPr txBox="1"/>
+          <p:nvPr/>
+        </p:nvSpPr>
+        <p:spPr>
+          <a:xfrm flipH="1">
+            <a:off x="9942181" y="3648975"/>
+            <a:ext cx="2444933" cy="400110"/>
+          </a:xfrm>
+          <a:prstGeom prst="rect">
+            <a:avLst/>
+          </a:prstGeom>
+          <a:noFill/>
+        </p:spPr>
+        <p:txBody>
+          <a:bodyPr wrap="square" rtlCol="0">
+            <a:spAutoFit/>
+          </a:bodyPr>
+          <a:lstStyle/>
+          <a:p>
+            <a:r>
+              <a:rPr lang="en-US" dirty="0"/>
+              <a:t>Help Desk</a:t>
+            </a:r>
+          </a:p>
+        </p:txBody>
+      </p:sp>
+      <p:graphicFrame>
+        <p:nvGraphicFramePr>
+          <p:cNvPr id="8" name="Table 7">
+            <a:extLst>
+              <a:ext uri="{FF2B5EF4-FFF2-40B4-BE49-F238E27FC236}">
+                <a16:creationId xmlns:a16="http://schemas.microsoft.com/office/drawing/2014/main" id="{D7C43544-FAC7-4A43-B862-E29575CC96BC}"/>
+              </a:ext>
+            </a:extLst>
+          </p:cNvPr>
+          <p:cNvGraphicFramePr>
+            <a:graphicFrameLocks noGrp="1"/>
+          </p:cNvGraphicFramePr>
+          <p:nvPr>
+            <p:extLst>
+              <p:ext uri="{D42A27DB-BD31-4B8C-83A1-F6EECF244321}">
+                <p14:modId xmlns:p14="http://schemas.microsoft.com/office/powerpoint/2010/main" val="823021736"/>
+              </p:ext>
+            </p:extLst>
+          </p:nvPr>
+        </p:nvGraphicFramePr>
+        <p:xfrm>
+          <a:off x="9987253" y="4063757"/>
+          <a:ext cx="3572199" cy="3253859"/>
+        </p:xfrm>
+        <a:graphic>
+          <a:graphicData uri="http://schemas.openxmlformats.org/drawingml/2006/table">
+            <a:tbl>
+              <a:tblPr firstRow="1">
+                <a:tableStyleId>{5C22544A-7EE6-4342-B048-85BDC9FD1C3A}</a:tableStyleId>
+              </a:tblPr>
+              <a:tblGrid>
+                <a:gridCol w="1105468">
+                  <a:extLst>
+                    <a:ext uri="{9D8B030D-6E8A-4147-A177-3AD203B41FA5}">
+                      <a16:colId xmlns:a16="http://schemas.microsoft.com/office/drawing/2014/main" val="1333462331"/>
+                    </a:ext>
+                  </a:extLst>
+                </a:gridCol>
+                <a:gridCol w="2466731">
+                  <a:extLst>
+                    <a:ext uri="{9D8B030D-6E8A-4147-A177-3AD203B41FA5}">
+                      <a16:colId xmlns:a16="http://schemas.microsoft.com/office/drawing/2014/main" val="668155110"/>
+                    </a:ext>
+                  </a:extLst>
+                </a:gridCol>
+              </a:tblGrid>
+              <a:tr h="165373">
+                <a:tc>
+                  <a:txBody>
+                    <a:bodyPr/>
+                    <a:lstStyle/>
+                    <a:p>
+                      <a:pPr marL="0" marR="0">
+                        <a:lnSpc>
+                          <a:spcPct val="107000"/>
+                        </a:lnSpc>
+                        <a:spcBef>
+                          <a:spcPts val="0"/>
+                        </a:spcBef>
+                        <a:spcAft>
+                          <a:spcPts val="800"/>
+                        </a:spcAft>
+                      </a:pPr>
+                      <a:r>
+                        <a:rPr lang="en-US" sz="1600" dirty="0">
+                          <a:solidFill>
+                            <a:schemeClr val="tx1"/>
+                          </a:solidFill>
+                          <a:effectLst/>
+                        </a:rPr>
+                        <a:t>Day</a:t>
+                      </a:r>
+                      <a:endParaRPr lang="en-US" sz="1600" dirty="0">
+                        <a:solidFill>
+                          <a:schemeClr val="tx1"/>
+                        </a:solidFill>
+                        <a:effectLst/>
+                        <a:latin typeface="Calibri" panose="020F0502020204030204" pitchFamily="34" charset="0"/>
+                        <a:ea typeface="Calibri" panose="020F0502020204030204" pitchFamily="34" charset="0"/>
+                        <a:cs typeface="Times New Roman" panose="02020603050405020304" pitchFamily="18" charset="0"/>
+                      </a:endParaRPr>
+                    </a:p>
+                  </a:txBody>
+                  <a:tcPr marL="15875" marR="15875" marT="15875" marB="15875" anchor="ctr">
+                    <a:lnL w="12700" cap="flat" cmpd="sng" algn="ctr">
+                      <a:solidFill>
+                        <a:schemeClr val="tx1"/>
+                      </a:solidFill>
+                      <a:prstDash val="solid"/>
+                      <a:round/>
+                      <a:headEnd type="none" w="med" len="med"/>
+                      <a:tailEnd type="none" w="med" len="med"/>
+                    </a:lnL>
+                    <a:lnR w="12700" cap="flat" cmpd="sng" algn="ctr">
+                      <a:solidFill>
+                        <a:schemeClr val="tx1"/>
+                      </a:solidFill>
+                      <a:prstDash val="solid"/>
+                      <a:round/>
+                      <a:headEnd type="none" w="med" len="med"/>
+                      <a:tailEnd type="none" w="med" len="med"/>
+                    </a:lnR>
+                    <a:lnT w="12700" cap="flat" cmpd="sng" algn="ctr">
+                      <a:solidFill>
+                        <a:schemeClr val="tx1"/>
+                      </a:solidFill>
+                      <a:prstDash val="solid"/>
+                      <a:round/>
+                      <a:headEnd type="none" w="med" len="med"/>
+                      <a:tailEnd type="none" w="med" len="med"/>
+                    </a:lnT>
+                    <a:lnB w="12700" cap="flat" cmpd="sng" algn="ctr">
+                      <a:solidFill>
+                        <a:schemeClr val="tx1"/>
+                      </a:solidFill>
+                      <a:prstDash val="solid"/>
+                      <a:round/>
+                      <a:headEnd type="none" w="med" len="med"/>
+                      <a:tailEnd type="none" w="med" len="med"/>
+                    </a:lnB>
+                    <a:lnTlToBr w="12700" cmpd="sng">
+                      <a:noFill/>
+                      <a:prstDash val="solid"/>
+                    </a:lnTlToBr>
+                    <a:lnBlToTr w="12700" cmpd="sng">
+                      <a:noFill/>
+                      <a:prstDash val="solid"/>
+                    </a:lnBlToTr>
+                    <a:solidFill>
+                      <a:schemeClr val="bg1"/>
+                    </a:solidFill>
+                  </a:tcPr>
+                </a:tc>
+                <a:tc>
+                  <a:txBody>
+                    <a:bodyPr/>
+                    <a:lstStyle/>
+                    <a:p>
+                      <a:pPr marL="0" marR="0">
+                        <a:lnSpc>
+                          <a:spcPct val="107000"/>
+                        </a:lnSpc>
+                        <a:spcBef>
+                          <a:spcPts val="0"/>
+                        </a:spcBef>
+                        <a:spcAft>
+                          <a:spcPts val="800"/>
+                        </a:spcAft>
+                      </a:pPr>
+                      <a:r>
+                        <a:rPr lang="en-US" sz="1600" dirty="0">
+                          <a:solidFill>
+                            <a:schemeClr val="tx1"/>
+                          </a:solidFill>
+                          <a:effectLst/>
+                        </a:rPr>
+                        <a:t>Time : Room</a:t>
+                      </a:r>
+                      <a:endParaRPr lang="en-US" sz="1600" dirty="0">
+                        <a:solidFill>
+                          <a:schemeClr val="tx1"/>
+                        </a:solidFill>
+                        <a:effectLst/>
+                        <a:latin typeface="Calibri" panose="020F0502020204030204" pitchFamily="34" charset="0"/>
+                        <a:ea typeface="Calibri" panose="020F0502020204030204" pitchFamily="34" charset="0"/>
+                        <a:cs typeface="Times New Roman" panose="02020603050405020304" pitchFamily="18" charset="0"/>
+                      </a:endParaRPr>
+                    </a:p>
+                  </a:txBody>
+                  <a:tcPr marL="15875" marR="15875" marT="15875" marB="15875" anchor="ctr">
+                    <a:lnL w="12700" cap="flat" cmpd="sng" algn="ctr">
+                      <a:solidFill>
+                        <a:schemeClr val="tx1"/>
+                      </a:solidFill>
+                      <a:prstDash val="solid"/>
+                      <a:round/>
+                      <a:headEnd type="none" w="med" len="med"/>
+                      <a:tailEnd type="none" w="med" len="med"/>
+                    </a:lnL>
+                    <a:lnR w="12700" cap="flat" cmpd="sng" algn="ctr">
+                      <a:solidFill>
+                        <a:schemeClr val="tx1"/>
+                      </a:solidFill>
+                      <a:prstDash val="solid"/>
+                      <a:round/>
+                      <a:headEnd type="none" w="med" len="med"/>
+                      <a:tailEnd type="none" w="med" len="med"/>
+                    </a:lnR>
+                    <a:lnT w="12700" cap="flat" cmpd="sng" algn="ctr">
+                      <a:solidFill>
+                        <a:schemeClr val="tx1"/>
+                      </a:solidFill>
+                      <a:prstDash val="solid"/>
+                      <a:round/>
+                      <a:headEnd type="none" w="med" len="med"/>
+                      <a:tailEnd type="none" w="med" len="med"/>
+                    </a:lnT>
+                    <a:lnB w="12700" cap="flat" cmpd="sng" algn="ctr">
+                      <a:solidFill>
+                        <a:schemeClr val="tx1"/>
+                      </a:solidFill>
+                      <a:prstDash val="solid"/>
+                      <a:round/>
+                      <a:headEnd type="none" w="med" len="med"/>
+                      <a:tailEnd type="none" w="med" len="med"/>
+                    </a:lnB>
+                    <a:lnTlToBr w="12700" cmpd="sng">
+                      <a:noFill/>
+                      <a:prstDash val="solid"/>
+                    </a:lnTlToBr>
+                    <a:lnBlToTr w="12700" cmpd="sng">
+                      <a:noFill/>
+                      <a:prstDash val="solid"/>
+                    </a:lnBlToTr>
+                    <a:solidFill>
+                      <a:schemeClr val="bg1"/>
+                    </a:solidFill>
+                  </a:tcPr>
+                </a:tc>
+                <a:extLst>
+                  <a:ext uri="{0D108BD9-81ED-4DB2-BD59-A6C34878D82A}">
+                    <a16:rowId xmlns:a16="http://schemas.microsoft.com/office/drawing/2014/main" val="3093163206"/>
+                  </a:ext>
+                </a:extLst>
+              </a:tr>
+              <a:tr h="581669">
+                <a:tc>
+                  <a:txBody>
+                    <a:bodyPr/>
+                    <a:lstStyle/>
+                    <a:p>
+                      <a:pPr marL="0" marR="0">
+                        <a:lnSpc>
+                          <a:spcPct val="107000"/>
+                        </a:lnSpc>
+                        <a:spcBef>
+                          <a:spcPts val="0"/>
+                        </a:spcBef>
+                        <a:spcAft>
+                          <a:spcPts val="800"/>
+                        </a:spcAft>
+                      </a:pPr>
+                      <a:r>
+                        <a:rPr lang="en-US" sz="1600" dirty="0">
+                          <a:effectLst/>
+                        </a:rPr>
+                        <a:t>Monday</a:t>
+                      </a:r>
+                      <a:endParaRPr lang="en-US" sz="1600" dirty="0">
+                        <a:effectLst/>
+                        <a:latin typeface="Calibri" panose="020F0502020204030204" pitchFamily="34" charset="0"/>
+                        <a:ea typeface="Calibri" panose="020F0502020204030204" pitchFamily="34" charset="0"/>
+                        <a:cs typeface="Times New Roman" panose="02020603050405020304" pitchFamily="18" charset="0"/>
+                      </a:endParaRPr>
+                    </a:p>
+                  </a:txBody>
+                  <a:tcPr marL="15875" marR="15875" marT="15875" marB="15875" anchor="ctr">
+                    <a:lnL w="12700" cap="flat" cmpd="sng" algn="ctr">
+                      <a:solidFill>
+                        <a:schemeClr val="tx1"/>
+                      </a:solidFill>
+                      <a:prstDash val="solid"/>
+                      <a:round/>
+                      <a:headEnd type="none" w="med" len="med"/>
+                      <a:tailEnd type="none" w="med" len="med"/>
+                    </a:lnL>
+                    <a:lnR w="12700" cap="flat" cmpd="sng" algn="ctr">
+                      <a:solidFill>
+                        <a:schemeClr val="tx1"/>
+                      </a:solidFill>
+                      <a:prstDash val="solid"/>
+                      <a:round/>
+                      <a:headEnd type="none" w="med" len="med"/>
+                      <a:tailEnd type="none" w="med" len="med"/>
+                    </a:lnR>
+                    <a:lnT w="12700" cap="flat" cmpd="sng" algn="ctr">
+                      <a:solidFill>
+                        <a:schemeClr val="tx1"/>
+                      </a:solidFill>
+                      <a:prstDash val="solid"/>
+                      <a:round/>
+                      <a:headEnd type="none" w="med" len="med"/>
+                      <a:tailEnd type="none" w="med" len="med"/>
+                    </a:lnT>
+                    <a:lnB w="12700" cap="flat" cmpd="sng" algn="ctr">
+                      <a:solidFill>
+                        <a:schemeClr val="tx1"/>
+                      </a:solidFill>
+                      <a:prstDash val="solid"/>
+                      <a:round/>
+                      <a:headEnd type="none" w="med" len="med"/>
+                      <a:tailEnd type="none" w="med" len="med"/>
+                    </a:lnB>
+                    <a:lnTlToBr w="12700" cmpd="sng">
+                      <a:noFill/>
+                      <a:prstDash val="solid"/>
+                    </a:lnTlToBr>
+                    <a:lnBlToTr w="12700" cmpd="sng">
+                      <a:noFill/>
+                      <a:prstDash val="solid"/>
+                    </a:lnBlToTr>
+                    <a:solidFill>
+                      <a:schemeClr val="bg1"/>
+                    </a:solidFill>
+                  </a:tcPr>
+                </a:tc>
+                <a:tc>
+                  <a:txBody>
+                    <a:bodyPr/>
+                    <a:lstStyle/>
+                    <a:p>
+                      <a:pPr marL="0" marR="0">
+                        <a:lnSpc>
+                          <a:spcPct val="107000"/>
+                        </a:lnSpc>
+                        <a:spcBef>
+                          <a:spcPts val="0"/>
+                        </a:spcBef>
+                        <a:spcAft>
+                          <a:spcPts val="800"/>
+                        </a:spcAft>
+                      </a:pPr>
+                      <a:r>
+                        <a:rPr lang="en-US" sz="1600" dirty="0">
+                          <a:effectLst/>
+                        </a:rPr>
+                        <a:t>12 PM - 2 PM : CSB 120</a:t>
+                      </a:r>
+                      <a:endParaRPr lang="en-US" sz="1600" dirty="0">
+                        <a:effectLst/>
+                        <a:latin typeface="Calibri" panose="020F0502020204030204" pitchFamily="34" charset="0"/>
+                        <a:ea typeface="Calibri" panose="020F0502020204030204" pitchFamily="34" charset="0"/>
+                        <a:cs typeface="Times New Roman" panose="02020603050405020304" pitchFamily="18" charset="0"/>
+                      </a:endParaRPr>
+                    </a:p>
+                  </a:txBody>
+                  <a:tcPr marL="15875" marR="15875" marT="15875" marB="15875" anchor="ctr">
+                    <a:lnL w="12700" cap="flat" cmpd="sng" algn="ctr">
+                      <a:solidFill>
+                        <a:schemeClr val="tx1"/>
+                      </a:solidFill>
+                      <a:prstDash val="solid"/>
+                      <a:round/>
+                      <a:headEnd type="none" w="med" len="med"/>
+                      <a:tailEnd type="none" w="med" len="med"/>
+                    </a:lnL>
+                    <a:lnR w="12700" cap="flat" cmpd="sng" algn="ctr">
+                      <a:solidFill>
+                        <a:schemeClr val="tx1"/>
+                      </a:solidFill>
+                      <a:prstDash val="solid"/>
+                      <a:round/>
+                      <a:headEnd type="none" w="med" len="med"/>
+                      <a:tailEnd type="none" w="med" len="med"/>
+                    </a:lnR>
+                    <a:lnT w="12700" cap="flat" cmpd="sng" algn="ctr">
+                      <a:solidFill>
+                        <a:schemeClr val="tx1"/>
+                      </a:solidFill>
+                      <a:prstDash val="solid"/>
+                      <a:round/>
+                      <a:headEnd type="none" w="med" len="med"/>
+                      <a:tailEnd type="none" w="med" len="med"/>
+                    </a:lnT>
+                    <a:lnB w="12700" cap="flat" cmpd="sng" algn="ctr">
+                      <a:solidFill>
+                        <a:schemeClr val="tx1"/>
+                      </a:solidFill>
+                      <a:prstDash val="solid"/>
+                      <a:round/>
+                      <a:headEnd type="none" w="med" len="med"/>
+                      <a:tailEnd type="none" w="med" len="med"/>
+                    </a:lnB>
+                    <a:lnTlToBr w="12700" cmpd="sng">
+                      <a:noFill/>
+                      <a:prstDash val="solid"/>
+                    </a:lnTlToBr>
+                    <a:lnBlToTr w="12700" cmpd="sng">
+                      <a:noFill/>
+                      <a:prstDash val="solid"/>
+                    </a:lnBlToTr>
+                    <a:solidFill>
+                      <a:schemeClr val="bg1"/>
+                    </a:solidFill>
+                  </a:tcPr>
+                </a:tc>
+                <a:extLst>
+                  <a:ext uri="{0D108BD9-81ED-4DB2-BD59-A6C34878D82A}">
+                    <a16:rowId xmlns:a16="http://schemas.microsoft.com/office/drawing/2014/main" val="1139786997"/>
+                  </a:ext>
+                </a:extLst>
+              </a:tr>
+              <a:tr h="307347">
+                <a:tc>
+                  <a:txBody>
+                    <a:bodyPr/>
+                    <a:lstStyle/>
+                    <a:p>
+                      <a:pPr marL="0" marR="0">
+                        <a:lnSpc>
+                          <a:spcPct val="107000"/>
+                        </a:lnSpc>
+                        <a:spcBef>
+                          <a:spcPts val="0"/>
+                        </a:spcBef>
+                        <a:spcAft>
+                          <a:spcPts val="800"/>
+                        </a:spcAft>
+                      </a:pPr>
+                      <a:r>
+                        <a:rPr lang="en-US" sz="1600">
+                          <a:effectLst/>
+                        </a:rPr>
+                        <a:t>Tuesday</a:t>
+                      </a:r>
+                      <a:endParaRPr lang="en-US" sz="1600">
+                        <a:effectLst/>
+                        <a:latin typeface="Calibri" panose="020F0502020204030204" pitchFamily="34" charset="0"/>
+                        <a:ea typeface="Calibri" panose="020F0502020204030204" pitchFamily="34" charset="0"/>
+                        <a:cs typeface="Times New Roman" panose="02020603050405020304" pitchFamily="18" charset="0"/>
+                      </a:endParaRPr>
+                    </a:p>
+                  </a:txBody>
+                  <a:tcPr marL="15875" marR="15875" marT="15875" marB="15875" anchor="ctr">
+                    <a:lnL w="12700" cap="flat" cmpd="sng" algn="ctr">
+                      <a:solidFill>
+                        <a:schemeClr val="tx1"/>
+                      </a:solidFill>
+                      <a:prstDash val="solid"/>
+                      <a:round/>
+                      <a:headEnd type="none" w="med" len="med"/>
+                      <a:tailEnd type="none" w="med" len="med"/>
+                    </a:lnL>
+                    <a:lnR w="12700" cap="flat" cmpd="sng" algn="ctr">
+                      <a:solidFill>
+                        <a:schemeClr val="tx1"/>
+                      </a:solidFill>
+                      <a:prstDash val="solid"/>
+                      <a:round/>
+                      <a:headEnd type="none" w="med" len="med"/>
+                      <a:tailEnd type="none" w="med" len="med"/>
+                    </a:lnR>
+                    <a:lnT w="12700" cap="flat" cmpd="sng" algn="ctr">
+                      <a:solidFill>
+                        <a:schemeClr val="tx1"/>
+                      </a:solidFill>
+                      <a:prstDash val="solid"/>
+                      <a:round/>
+                      <a:headEnd type="none" w="med" len="med"/>
+                      <a:tailEnd type="none" w="med" len="med"/>
+                    </a:lnT>
+                    <a:lnB w="12700" cap="flat" cmpd="sng" algn="ctr">
+                      <a:solidFill>
+                        <a:schemeClr val="tx1"/>
+                      </a:solidFill>
+                      <a:prstDash val="solid"/>
+                      <a:round/>
+                      <a:headEnd type="none" w="med" len="med"/>
+                      <a:tailEnd type="none" w="med" len="med"/>
+                    </a:lnB>
+                    <a:lnTlToBr w="12700" cmpd="sng">
+                      <a:noFill/>
+                      <a:prstDash val="solid"/>
+                    </a:lnTlToBr>
+                    <a:lnBlToTr w="12700" cmpd="sng">
+                      <a:noFill/>
+                      <a:prstDash val="solid"/>
+                    </a:lnBlToTr>
+                    <a:solidFill>
+                      <a:schemeClr val="bg1"/>
+                    </a:solidFill>
+                  </a:tcPr>
+                </a:tc>
+                <a:tc>
+                  <a:txBody>
+                    <a:bodyPr/>
+                    <a:lstStyle/>
+                    <a:p>
+                      <a:pPr marL="0" marR="0">
+                        <a:lnSpc>
+                          <a:spcPct val="107000"/>
+                        </a:lnSpc>
+                        <a:spcBef>
+                          <a:spcPts val="0"/>
+                        </a:spcBef>
+                        <a:spcAft>
+                          <a:spcPts val="800"/>
+                        </a:spcAft>
+                      </a:pPr>
+                      <a:r>
+                        <a:rPr lang="en-US" sz="1600">
+                          <a:effectLst/>
+                        </a:rPr>
+                        <a:t>6 PM - 8 PM : Teams</a:t>
+                      </a:r>
+                      <a:endParaRPr lang="en-US" sz="1600">
+                        <a:effectLst/>
+                        <a:latin typeface="Calibri" panose="020F0502020204030204" pitchFamily="34" charset="0"/>
+                        <a:ea typeface="Calibri" panose="020F0502020204030204" pitchFamily="34" charset="0"/>
+                        <a:cs typeface="Times New Roman" panose="02020603050405020304" pitchFamily="18" charset="0"/>
+                      </a:endParaRPr>
+                    </a:p>
+                  </a:txBody>
+                  <a:tcPr marL="15875" marR="15875" marT="15875" marB="15875" anchor="ctr">
+                    <a:lnL w="12700" cap="flat" cmpd="sng" algn="ctr">
+                      <a:solidFill>
+                        <a:schemeClr val="tx1"/>
+                      </a:solidFill>
+                      <a:prstDash val="solid"/>
+                      <a:round/>
+                      <a:headEnd type="none" w="med" len="med"/>
+                      <a:tailEnd type="none" w="med" len="med"/>
+                    </a:lnL>
+                    <a:lnR w="12700" cap="flat" cmpd="sng" algn="ctr">
+                      <a:solidFill>
+                        <a:schemeClr val="tx1"/>
+                      </a:solidFill>
+                      <a:prstDash val="solid"/>
+                      <a:round/>
+                      <a:headEnd type="none" w="med" len="med"/>
+                      <a:tailEnd type="none" w="med" len="med"/>
+                    </a:lnR>
+                    <a:lnT w="12700" cap="flat" cmpd="sng" algn="ctr">
+                      <a:solidFill>
+                        <a:schemeClr val="tx1"/>
+                      </a:solidFill>
+                      <a:prstDash val="solid"/>
+                      <a:round/>
+                      <a:headEnd type="none" w="med" len="med"/>
+                      <a:tailEnd type="none" w="med" len="med"/>
+                    </a:lnT>
+                    <a:lnB w="12700" cap="flat" cmpd="sng" algn="ctr">
+                      <a:solidFill>
+                        <a:schemeClr val="tx1"/>
+                      </a:solidFill>
+                      <a:prstDash val="solid"/>
+                      <a:round/>
+                      <a:headEnd type="none" w="med" len="med"/>
+                      <a:tailEnd type="none" w="med" len="med"/>
+                    </a:lnB>
+                    <a:lnTlToBr w="12700" cmpd="sng">
+                      <a:noFill/>
+                      <a:prstDash val="solid"/>
+                    </a:lnTlToBr>
+                    <a:lnBlToTr w="12700" cmpd="sng">
+                      <a:noFill/>
+                      <a:prstDash val="solid"/>
+                    </a:lnBlToTr>
+                    <a:solidFill>
+                      <a:schemeClr val="bg1"/>
+                    </a:solidFill>
+                  </a:tcPr>
+                </a:tc>
+                <a:extLst>
+                  <a:ext uri="{0D108BD9-81ED-4DB2-BD59-A6C34878D82A}">
+                    <a16:rowId xmlns:a16="http://schemas.microsoft.com/office/drawing/2014/main" val="1164388044"/>
+                  </a:ext>
+                </a:extLst>
+              </a:tr>
+              <a:tr h="581669">
+                <a:tc>
+                  <a:txBody>
+                    <a:bodyPr/>
+                    <a:lstStyle/>
+                    <a:p>
+                      <a:pPr marL="0" marR="0">
+                        <a:lnSpc>
+                          <a:spcPct val="107000"/>
+                        </a:lnSpc>
+                        <a:spcBef>
+                          <a:spcPts val="0"/>
+                        </a:spcBef>
+                        <a:spcAft>
+                          <a:spcPts val="800"/>
+                        </a:spcAft>
+                      </a:pPr>
+                      <a:r>
+                        <a:rPr lang="en-US" sz="1600">
+                          <a:effectLst/>
+                        </a:rPr>
+                        <a:t>Wednesday</a:t>
+                      </a:r>
+                      <a:endParaRPr lang="en-US" sz="1600">
+                        <a:effectLst/>
+                        <a:latin typeface="Calibri" panose="020F0502020204030204" pitchFamily="34" charset="0"/>
+                        <a:ea typeface="Calibri" panose="020F0502020204030204" pitchFamily="34" charset="0"/>
+                        <a:cs typeface="Times New Roman" panose="02020603050405020304" pitchFamily="18" charset="0"/>
+                      </a:endParaRPr>
+                    </a:p>
+                  </a:txBody>
+                  <a:tcPr marL="15875" marR="15875" marT="15875" marB="15875" anchor="ctr">
+                    <a:lnL w="12700" cap="flat" cmpd="sng" algn="ctr">
+                      <a:solidFill>
+                        <a:schemeClr val="tx1"/>
+                      </a:solidFill>
+                      <a:prstDash val="solid"/>
+                      <a:round/>
+                      <a:headEnd type="none" w="med" len="med"/>
+                      <a:tailEnd type="none" w="med" len="med"/>
+                    </a:lnL>
+                    <a:lnR w="12700" cap="flat" cmpd="sng" algn="ctr">
+                      <a:solidFill>
+                        <a:schemeClr val="tx1"/>
+                      </a:solidFill>
+                      <a:prstDash val="solid"/>
+                      <a:round/>
+                      <a:headEnd type="none" w="med" len="med"/>
+                      <a:tailEnd type="none" w="med" len="med"/>
+                    </a:lnR>
+                    <a:lnT w="12700" cap="flat" cmpd="sng" algn="ctr">
+                      <a:solidFill>
+                        <a:schemeClr val="tx1"/>
+                      </a:solidFill>
+                      <a:prstDash val="solid"/>
+                      <a:round/>
+                      <a:headEnd type="none" w="med" len="med"/>
+                      <a:tailEnd type="none" w="med" len="med"/>
+                    </a:lnT>
+                    <a:lnB w="12700" cap="flat" cmpd="sng" algn="ctr">
+                      <a:solidFill>
+                        <a:schemeClr val="tx1"/>
+                      </a:solidFill>
+                      <a:prstDash val="solid"/>
+                      <a:round/>
+                      <a:headEnd type="none" w="med" len="med"/>
+                      <a:tailEnd type="none" w="med" len="med"/>
+                    </a:lnB>
+                    <a:lnTlToBr w="12700" cmpd="sng">
+                      <a:noFill/>
+                      <a:prstDash val="solid"/>
+                    </a:lnTlToBr>
+                    <a:lnBlToTr w="12700" cmpd="sng">
+                      <a:noFill/>
+                      <a:prstDash val="solid"/>
+                    </a:lnBlToTr>
+                    <a:solidFill>
+                      <a:schemeClr val="bg1"/>
+                    </a:solidFill>
+                  </a:tcPr>
+                </a:tc>
+                <a:tc>
+                  <a:txBody>
+                    <a:bodyPr/>
+                    <a:lstStyle/>
+                    <a:p>
+                      <a:pPr marL="0" marR="0">
+                        <a:lnSpc>
+                          <a:spcPct val="107000"/>
+                        </a:lnSpc>
+                        <a:spcBef>
+                          <a:spcPts val="0"/>
+                        </a:spcBef>
+                        <a:spcAft>
+                          <a:spcPts val="800"/>
+                        </a:spcAft>
+                      </a:pPr>
+                      <a:r>
+                        <a:rPr lang="en-US" sz="1600">
+                          <a:effectLst/>
+                        </a:rPr>
+                        <a:t>3 PM - 5 PM : CSB 120</a:t>
+                      </a:r>
+                      <a:endParaRPr lang="en-US" sz="1600">
+                        <a:effectLst/>
+                        <a:latin typeface="Calibri" panose="020F0502020204030204" pitchFamily="34" charset="0"/>
+                        <a:ea typeface="Calibri" panose="020F0502020204030204" pitchFamily="34" charset="0"/>
+                        <a:cs typeface="Times New Roman" panose="02020603050405020304" pitchFamily="18" charset="0"/>
+                      </a:endParaRPr>
+                    </a:p>
+                  </a:txBody>
+                  <a:tcPr marL="15875" marR="15875" marT="15875" marB="15875" anchor="ctr">
+                    <a:lnL w="12700" cap="flat" cmpd="sng" algn="ctr">
+                      <a:solidFill>
+                        <a:schemeClr val="tx1"/>
+                      </a:solidFill>
+                      <a:prstDash val="solid"/>
+                      <a:round/>
+                      <a:headEnd type="none" w="med" len="med"/>
+                      <a:tailEnd type="none" w="med" len="med"/>
+                    </a:lnL>
+                    <a:lnR w="12700" cap="flat" cmpd="sng" algn="ctr">
+                      <a:solidFill>
+                        <a:schemeClr val="tx1"/>
+                      </a:solidFill>
+                      <a:prstDash val="solid"/>
+                      <a:round/>
+                      <a:headEnd type="none" w="med" len="med"/>
+                      <a:tailEnd type="none" w="med" len="med"/>
+                    </a:lnR>
+                    <a:lnT w="12700" cap="flat" cmpd="sng" algn="ctr">
+                      <a:solidFill>
+                        <a:schemeClr val="tx1"/>
+                      </a:solidFill>
+                      <a:prstDash val="solid"/>
+                      <a:round/>
+                      <a:headEnd type="none" w="med" len="med"/>
+                      <a:tailEnd type="none" w="med" len="med"/>
+                    </a:lnT>
+                    <a:lnB w="12700" cap="flat" cmpd="sng" algn="ctr">
+                      <a:solidFill>
+                        <a:schemeClr val="tx1"/>
+                      </a:solidFill>
+                      <a:prstDash val="solid"/>
+                      <a:round/>
+                      <a:headEnd type="none" w="med" len="med"/>
+                      <a:tailEnd type="none" w="med" len="med"/>
+                    </a:lnB>
+                    <a:lnTlToBr w="12700" cmpd="sng">
+                      <a:noFill/>
+                      <a:prstDash val="solid"/>
+                    </a:lnTlToBr>
+                    <a:lnBlToTr w="12700" cmpd="sng">
+                      <a:noFill/>
+                      <a:prstDash val="solid"/>
+                    </a:lnBlToTr>
+                    <a:solidFill>
+                      <a:schemeClr val="bg1"/>
+                    </a:solidFill>
+                  </a:tcPr>
+                </a:tc>
+                <a:extLst>
+                  <a:ext uri="{0D108BD9-81ED-4DB2-BD59-A6C34878D82A}">
+                    <a16:rowId xmlns:a16="http://schemas.microsoft.com/office/drawing/2014/main" val="1097778555"/>
+                  </a:ext>
+                </a:extLst>
+              </a:tr>
+              <a:tr h="307347">
+                <a:tc>
+                  <a:txBody>
+                    <a:bodyPr/>
+                    <a:lstStyle/>
+                    <a:p>
+                      <a:pPr marL="0" marR="0">
+                        <a:lnSpc>
+                          <a:spcPct val="107000"/>
+                        </a:lnSpc>
+                        <a:spcBef>
+                          <a:spcPts val="0"/>
+                        </a:spcBef>
+                        <a:spcAft>
+                          <a:spcPts val="800"/>
+                        </a:spcAft>
+                      </a:pPr>
+                      <a:r>
+                        <a:rPr lang="en-US" sz="1600">
+                          <a:effectLst/>
+                        </a:rPr>
+                        <a:t>Thursday</a:t>
+                      </a:r>
+                      <a:endParaRPr lang="en-US" sz="1600">
+                        <a:effectLst/>
+                        <a:latin typeface="Calibri" panose="020F0502020204030204" pitchFamily="34" charset="0"/>
+                        <a:ea typeface="Calibri" panose="020F0502020204030204" pitchFamily="34" charset="0"/>
+                        <a:cs typeface="Times New Roman" panose="02020603050405020304" pitchFamily="18" charset="0"/>
+                      </a:endParaRPr>
+                    </a:p>
+                  </a:txBody>
+                  <a:tcPr marL="15875" marR="15875" marT="15875" marB="15875" anchor="ctr">
+                    <a:lnL w="12700" cap="flat" cmpd="sng" algn="ctr">
+                      <a:solidFill>
+                        <a:schemeClr val="tx1"/>
+                      </a:solidFill>
+                      <a:prstDash val="solid"/>
+                      <a:round/>
+                      <a:headEnd type="none" w="med" len="med"/>
+                      <a:tailEnd type="none" w="med" len="med"/>
+                    </a:lnL>
+                    <a:lnR w="12700" cap="flat" cmpd="sng" algn="ctr">
+                      <a:solidFill>
+                        <a:schemeClr val="tx1"/>
+                      </a:solidFill>
+                      <a:prstDash val="solid"/>
+                      <a:round/>
+                      <a:headEnd type="none" w="med" len="med"/>
+                      <a:tailEnd type="none" w="med" len="med"/>
+                    </a:lnR>
+                    <a:lnT w="12700" cap="flat" cmpd="sng" algn="ctr">
+                      <a:solidFill>
+                        <a:schemeClr val="tx1"/>
+                      </a:solidFill>
+                      <a:prstDash val="solid"/>
+                      <a:round/>
+                      <a:headEnd type="none" w="med" len="med"/>
+                      <a:tailEnd type="none" w="med" len="med"/>
+                    </a:lnT>
+                    <a:lnB w="12700" cap="flat" cmpd="sng" algn="ctr">
+                      <a:solidFill>
+                        <a:schemeClr val="tx1"/>
+                      </a:solidFill>
+                      <a:prstDash val="solid"/>
+                      <a:round/>
+                      <a:headEnd type="none" w="med" len="med"/>
+                      <a:tailEnd type="none" w="med" len="med"/>
+                    </a:lnB>
+                    <a:lnTlToBr w="12700" cmpd="sng">
+                      <a:noFill/>
+                      <a:prstDash val="solid"/>
+                    </a:lnTlToBr>
+                    <a:lnBlToTr w="12700" cmpd="sng">
+                      <a:noFill/>
+                      <a:prstDash val="solid"/>
+                    </a:lnBlToTr>
+                    <a:solidFill>
+                      <a:schemeClr val="bg1"/>
+                    </a:solidFill>
+                  </a:tcPr>
+                </a:tc>
+                <a:tc>
+                  <a:txBody>
+                    <a:bodyPr/>
+                    <a:lstStyle/>
+                    <a:p>
+                      <a:pPr marL="0" marR="0">
+                        <a:lnSpc>
+                          <a:spcPct val="107000"/>
+                        </a:lnSpc>
+                        <a:spcBef>
+                          <a:spcPts val="0"/>
+                        </a:spcBef>
+                        <a:spcAft>
+                          <a:spcPts val="800"/>
+                        </a:spcAft>
+                      </a:pPr>
+                      <a:r>
+                        <a:rPr lang="en-US" sz="1600">
+                          <a:effectLst/>
+                        </a:rPr>
+                        <a:t>6 PM - 8 PM : Teams</a:t>
+                      </a:r>
+                      <a:endParaRPr lang="en-US" sz="1600">
+                        <a:effectLst/>
+                        <a:latin typeface="Calibri" panose="020F0502020204030204" pitchFamily="34" charset="0"/>
+                        <a:ea typeface="Calibri" panose="020F0502020204030204" pitchFamily="34" charset="0"/>
+                        <a:cs typeface="Times New Roman" panose="02020603050405020304" pitchFamily="18" charset="0"/>
+                      </a:endParaRPr>
+                    </a:p>
+                  </a:txBody>
+                  <a:tcPr marL="15875" marR="15875" marT="15875" marB="15875" anchor="ctr">
+                    <a:lnL w="12700" cap="flat" cmpd="sng" algn="ctr">
+                      <a:solidFill>
+                        <a:schemeClr val="tx1"/>
+                      </a:solidFill>
+                      <a:prstDash val="solid"/>
+                      <a:round/>
+                      <a:headEnd type="none" w="med" len="med"/>
+                      <a:tailEnd type="none" w="med" len="med"/>
+                    </a:lnL>
+                    <a:lnR w="12700" cap="flat" cmpd="sng" algn="ctr">
+                      <a:solidFill>
+                        <a:schemeClr val="tx1"/>
+                      </a:solidFill>
+                      <a:prstDash val="solid"/>
+                      <a:round/>
+                      <a:headEnd type="none" w="med" len="med"/>
+                      <a:tailEnd type="none" w="med" len="med"/>
+                    </a:lnR>
+                    <a:lnT w="12700" cap="flat" cmpd="sng" algn="ctr">
+                      <a:solidFill>
+                        <a:schemeClr val="tx1"/>
+                      </a:solidFill>
+                      <a:prstDash val="solid"/>
+                      <a:round/>
+                      <a:headEnd type="none" w="med" len="med"/>
+                      <a:tailEnd type="none" w="med" len="med"/>
+                    </a:lnT>
+                    <a:lnB w="12700" cap="flat" cmpd="sng" algn="ctr">
+                      <a:solidFill>
+                        <a:schemeClr val="tx1"/>
+                      </a:solidFill>
+                      <a:prstDash val="solid"/>
+                      <a:round/>
+                      <a:headEnd type="none" w="med" len="med"/>
+                      <a:tailEnd type="none" w="med" len="med"/>
+                    </a:lnB>
+                    <a:lnTlToBr w="12700" cmpd="sng">
+                      <a:noFill/>
+                      <a:prstDash val="solid"/>
+                    </a:lnTlToBr>
+                    <a:lnBlToTr w="12700" cmpd="sng">
+                      <a:noFill/>
+                      <a:prstDash val="solid"/>
+                    </a:lnBlToTr>
+                    <a:solidFill>
+                      <a:schemeClr val="bg1"/>
+                    </a:solidFill>
+                  </a:tcPr>
+                </a:tc>
+                <a:extLst>
+                  <a:ext uri="{0D108BD9-81ED-4DB2-BD59-A6C34878D82A}">
+                    <a16:rowId xmlns:a16="http://schemas.microsoft.com/office/drawing/2014/main" val="1747960062"/>
+                  </a:ext>
+                </a:extLst>
+              </a:tr>
+              <a:tr h="581669">
+                <a:tc>
+                  <a:txBody>
+                    <a:bodyPr/>
+                    <a:lstStyle/>
+                    <a:p>
+                      <a:pPr marL="0" marR="0">
+                        <a:lnSpc>
+                          <a:spcPct val="107000"/>
+                        </a:lnSpc>
+                        <a:spcBef>
+                          <a:spcPts val="0"/>
+                        </a:spcBef>
+                        <a:spcAft>
+                          <a:spcPts val="800"/>
+                        </a:spcAft>
+                      </a:pPr>
+                      <a:r>
+                        <a:rPr lang="en-US" sz="1600">
+                          <a:effectLst/>
+                        </a:rPr>
+                        <a:t>Friday</a:t>
+                      </a:r>
+                      <a:endParaRPr lang="en-US" sz="1600">
+                        <a:effectLst/>
+                        <a:latin typeface="Calibri" panose="020F0502020204030204" pitchFamily="34" charset="0"/>
+                        <a:ea typeface="Calibri" panose="020F0502020204030204" pitchFamily="34" charset="0"/>
+                        <a:cs typeface="Times New Roman" panose="02020603050405020304" pitchFamily="18" charset="0"/>
+                      </a:endParaRPr>
+                    </a:p>
+                  </a:txBody>
+                  <a:tcPr marL="15875" marR="15875" marT="15875" marB="15875" anchor="ctr">
+                    <a:lnL w="12700" cap="flat" cmpd="sng" algn="ctr">
+                      <a:solidFill>
+                        <a:schemeClr val="tx1"/>
+                      </a:solidFill>
+                      <a:prstDash val="solid"/>
+                      <a:round/>
+                      <a:headEnd type="none" w="med" len="med"/>
+                      <a:tailEnd type="none" w="med" len="med"/>
+                    </a:lnL>
+                    <a:lnR w="12700" cap="flat" cmpd="sng" algn="ctr">
+                      <a:solidFill>
+                        <a:schemeClr val="tx1"/>
+                      </a:solidFill>
+                      <a:prstDash val="solid"/>
+                      <a:round/>
+                      <a:headEnd type="none" w="med" len="med"/>
+                      <a:tailEnd type="none" w="med" len="med"/>
+                    </a:lnR>
+                    <a:lnT w="12700" cap="flat" cmpd="sng" algn="ctr">
+                      <a:solidFill>
+                        <a:schemeClr val="tx1"/>
+                      </a:solidFill>
+                      <a:prstDash val="solid"/>
+                      <a:round/>
+                      <a:headEnd type="none" w="med" len="med"/>
+                      <a:tailEnd type="none" w="med" len="med"/>
+                    </a:lnT>
+                    <a:lnB w="12700" cap="flat" cmpd="sng" algn="ctr">
+                      <a:solidFill>
+                        <a:schemeClr val="tx1"/>
+                      </a:solidFill>
+                      <a:prstDash val="solid"/>
+                      <a:round/>
+                      <a:headEnd type="none" w="med" len="med"/>
+                      <a:tailEnd type="none" w="med" len="med"/>
+                    </a:lnB>
+                    <a:lnTlToBr w="12700" cmpd="sng">
+                      <a:noFill/>
+                      <a:prstDash val="solid"/>
+                    </a:lnTlToBr>
+                    <a:lnBlToTr w="12700" cmpd="sng">
+                      <a:noFill/>
+                      <a:prstDash val="solid"/>
+                    </a:lnBlToTr>
+                    <a:solidFill>
+                      <a:schemeClr val="bg1"/>
+                    </a:solidFill>
+                  </a:tcPr>
+                </a:tc>
+                <a:tc>
+                  <a:txBody>
+                    <a:bodyPr/>
+                    <a:lstStyle/>
+                    <a:p>
+                      <a:pPr marL="0" marR="0">
+                        <a:lnSpc>
+                          <a:spcPct val="107000"/>
+                        </a:lnSpc>
+                        <a:spcBef>
+                          <a:spcPts val="0"/>
+                        </a:spcBef>
+                        <a:spcAft>
+                          <a:spcPts val="800"/>
+                        </a:spcAft>
+                      </a:pPr>
+                      <a:r>
+                        <a:rPr lang="en-US" sz="1600">
+                          <a:effectLst/>
+                        </a:rPr>
+                        <a:t>3 PM - 5 PM : CSB 120</a:t>
+                      </a:r>
+                      <a:endParaRPr lang="en-US" sz="1600">
+                        <a:effectLst/>
+                        <a:latin typeface="Calibri" panose="020F0502020204030204" pitchFamily="34" charset="0"/>
+                        <a:ea typeface="Calibri" panose="020F0502020204030204" pitchFamily="34" charset="0"/>
+                        <a:cs typeface="Times New Roman" panose="02020603050405020304" pitchFamily="18" charset="0"/>
+                      </a:endParaRPr>
+                    </a:p>
+                  </a:txBody>
+                  <a:tcPr marL="15875" marR="15875" marT="15875" marB="15875" anchor="ctr">
+                    <a:lnL w="12700" cap="flat" cmpd="sng" algn="ctr">
+                      <a:solidFill>
+                        <a:schemeClr val="tx1"/>
+                      </a:solidFill>
+                      <a:prstDash val="solid"/>
+                      <a:round/>
+                      <a:headEnd type="none" w="med" len="med"/>
+                      <a:tailEnd type="none" w="med" len="med"/>
+                    </a:lnL>
+                    <a:lnR w="12700" cap="flat" cmpd="sng" algn="ctr">
+                      <a:solidFill>
+                        <a:schemeClr val="tx1"/>
+                      </a:solidFill>
+                      <a:prstDash val="solid"/>
+                      <a:round/>
+                      <a:headEnd type="none" w="med" len="med"/>
+                      <a:tailEnd type="none" w="med" len="med"/>
+                    </a:lnR>
+                    <a:lnT w="12700" cap="flat" cmpd="sng" algn="ctr">
+                      <a:solidFill>
+                        <a:schemeClr val="tx1"/>
+                      </a:solidFill>
+                      <a:prstDash val="solid"/>
+                      <a:round/>
+                      <a:headEnd type="none" w="med" len="med"/>
+                      <a:tailEnd type="none" w="med" len="med"/>
+                    </a:lnT>
+                    <a:lnB w="12700" cap="flat" cmpd="sng" algn="ctr">
+                      <a:solidFill>
+                        <a:schemeClr val="tx1"/>
+                      </a:solidFill>
+                      <a:prstDash val="solid"/>
+                      <a:round/>
+                      <a:headEnd type="none" w="med" len="med"/>
+                      <a:tailEnd type="none" w="med" len="med"/>
+                    </a:lnB>
+                    <a:lnTlToBr w="12700" cmpd="sng">
+                      <a:noFill/>
+                      <a:prstDash val="solid"/>
+                    </a:lnTlToBr>
+                    <a:lnBlToTr w="12700" cmpd="sng">
+                      <a:noFill/>
+                      <a:prstDash val="solid"/>
+                    </a:lnBlToTr>
+                    <a:solidFill>
+                      <a:schemeClr val="bg1"/>
+                    </a:solidFill>
+                  </a:tcPr>
+                </a:tc>
+                <a:extLst>
+                  <a:ext uri="{0D108BD9-81ED-4DB2-BD59-A6C34878D82A}">
+                    <a16:rowId xmlns:a16="http://schemas.microsoft.com/office/drawing/2014/main" val="1553865624"/>
+                  </a:ext>
+                </a:extLst>
+              </a:tr>
+              <a:tr h="307347">
+                <a:tc>
+                  <a:txBody>
+                    <a:bodyPr/>
+                    <a:lstStyle/>
+                    <a:p>
+                      <a:pPr marL="0" marR="0">
+                        <a:lnSpc>
+                          <a:spcPct val="107000"/>
+                        </a:lnSpc>
+                        <a:spcBef>
+                          <a:spcPts val="0"/>
+                        </a:spcBef>
+                        <a:spcAft>
+                          <a:spcPts val="800"/>
+                        </a:spcAft>
+                      </a:pPr>
+                      <a:r>
+                        <a:rPr lang="en-US" sz="1600">
+                          <a:effectLst/>
+                        </a:rPr>
+                        <a:t>Saturday</a:t>
+                      </a:r>
+                      <a:endParaRPr lang="en-US" sz="1600">
+                        <a:effectLst/>
+                        <a:latin typeface="Calibri" panose="020F0502020204030204" pitchFamily="34" charset="0"/>
+                        <a:ea typeface="Calibri" panose="020F0502020204030204" pitchFamily="34" charset="0"/>
+                        <a:cs typeface="Times New Roman" panose="02020603050405020304" pitchFamily="18" charset="0"/>
+                      </a:endParaRPr>
+                    </a:p>
+                  </a:txBody>
+                  <a:tcPr marL="15875" marR="15875" marT="15875" marB="15875" anchor="ctr">
+                    <a:lnL w="12700" cap="flat" cmpd="sng" algn="ctr">
+                      <a:solidFill>
+                        <a:schemeClr val="tx1"/>
+                      </a:solidFill>
+                      <a:prstDash val="solid"/>
+                      <a:round/>
+                      <a:headEnd type="none" w="med" len="med"/>
+                      <a:tailEnd type="none" w="med" len="med"/>
+                    </a:lnL>
+                    <a:lnR w="12700" cap="flat" cmpd="sng" algn="ctr">
+                      <a:solidFill>
+                        <a:schemeClr val="tx1"/>
+                      </a:solidFill>
+                      <a:prstDash val="solid"/>
+                      <a:round/>
+                      <a:headEnd type="none" w="med" len="med"/>
+                      <a:tailEnd type="none" w="med" len="med"/>
+                    </a:lnR>
+                    <a:lnT w="12700" cap="flat" cmpd="sng" algn="ctr">
+                      <a:solidFill>
+                        <a:schemeClr val="tx1"/>
+                      </a:solidFill>
+                      <a:prstDash val="solid"/>
+                      <a:round/>
+                      <a:headEnd type="none" w="med" len="med"/>
+                      <a:tailEnd type="none" w="med" len="med"/>
+                    </a:lnT>
+                    <a:lnB w="12700" cap="flat" cmpd="sng" algn="ctr">
+                      <a:solidFill>
+                        <a:schemeClr val="tx1"/>
+                      </a:solidFill>
+                      <a:prstDash val="solid"/>
+                      <a:round/>
+                      <a:headEnd type="none" w="med" len="med"/>
+                      <a:tailEnd type="none" w="med" len="med"/>
+                    </a:lnB>
+                    <a:lnTlToBr w="12700" cmpd="sng">
+                      <a:noFill/>
+                      <a:prstDash val="solid"/>
+                    </a:lnTlToBr>
+                    <a:lnBlToTr w="12700" cmpd="sng">
+                      <a:noFill/>
+                      <a:prstDash val="solid"/>
+                    </a:lnBlToTr>
+                    <a:solidFill>
+                      <a:schemeClr val="bg1"/>
+                    </a:solidFill>
+                  </a:tcPr>
+                </a:tc>
+                <a:tc>
+                  <a:txBody>
+                    <a:bodyPr/>
+                    <a:lstStyle/>
+                    <a:p>
+                      <a:pPr marL="0" marR="0">
+                        <a:lnSpc>
+                          <a:spcPct val="107000"/>
+                        </a:lnSpc>
+                        <a:spcBef>
+                          <a:spcPts val="0"/>
+                        </a:spcBef>
+                        <a:spcAft>
+                          <a:spcPts val="800"/>
+                        </a:spcAft>
+                      </a:pPr>
+                      <a:r>
+                        <a:rPr lang="en-US" sz="1600" dirty="0">
+                          <a:effectLst/>
+                        </a:rPr>
+                        <a:t>12 PM - 4 PM : Teams</a:t>
+                      </a:r>
+                      <a:endParaRPr lang="en-US" sz="1600" dirty="0">
+                        <a:effectLst/>
+                        <a:latin typeface="Calibri" panose="020F0502020204030204" pitchFamily="34" charset="0"/>
+                        <a:ea typeface="Calibri" panose="020F0502020204030204" pitchFamily="34" charset="0"/>
+                        <a:cs typeface="Times New Roman" panose="02020603050405020304" pitchFamily="18" charset="0"/>
+                      </a:endParaRPr>
+                    </a:p>
+                  </a:txBody>
+                  <a:tcPr marL="15875" marR="15875" marT="15875" marB="15875" anchor="ctr">
+                    <a:lnL w="12700" cap="flat" cmpd="sng" algn="ctr">
+                      <a:solidFill>
+                        <a:schemeClr val="tx1"/>
+                      </a:solidFill>
+                      <a:prstDash val="solid"/>
+                      <a:round/>
+                      <a:headEnd type="none" w="med" len="med"/>
+                      <a:tailEnd type="none" w="med" len="med"/>
+                    </a:lnL>
+                    <a:lnR w="12700" cap="flat" cmpd="sng" algn="ctr">
+                      <a:solidFill>
+                        <a:schemeClr val="tx1"/>
+                      </a:solidFill>
+                      <a:prstDash val="solid"/>
+                      <a:round/>
+                      <a:headEnd type="none" w="med" len="med"/>
+                      <a:tailEnd type="none" w="med" len="med"/>
+                    </a:lnR>
+                    <a:lnT w="12700" cap="flat" cmpd="sng" algn="ctr">
+                      <a:solidFill>
+                        <a:schemeClr val="tx1"/>
+                      </a:solidFill>
+                      <a:prstDash val="solid"/>
+                      <a:round/>
+                      <a:headEnd type="none" w="med" len="med"/>
+                      <a:tailEnd type="none" w="med" len="med"/>
+                    </a:lnT>
+                    <a:lnB w="12700" cap="flat" cmpd="sng" algn="ctr">
+                      <a:solidFill>
+                        <a:schemeClr val="tx1"/>
+                      </a:solidFill>
+                      <a:prstDash val="solid"/>
+                      <a:round/>
+                      <a:headEnd type="none" w="med" len="med"/>
+                      <a:tailEnd type="none" w="med" len="med"/>
+                    </a:lnB>
+                    <a:lnTlToBr w="12700" cmpd="sng">
+                      <a:noFill/>
+                      <a:prstDash val="solid"/>
+                    </a:lnTlToBr>
+                    <a:lnBlToTr w="12700" cmpd="sng">
+                      <a:noFill/>
+                      <a:prstDash val="solid"/>
+                    </a:lnBlToTr>
+                    <a:solidFill>
+                      <a:schemeClr val="bg1"/>
+                    </a:solidFill>
+                  </a:tcPr>
+                </a:tc>
+                <a:extLst>
+                  <a:ext uri="{0D108BD9-81ED-4DB2-BD59-A6C34878D82A}">
+                    <a16:rowId xmlns:a16="http://schemas.microsoft.com/office/drawing/2014/main" val="3921746368"/>
+                  </a:ext>
+                </a:extLst>
+              </a:tr>
+              <a:tr h="307347">
+                <a:tc>
+                  <a:txBody>
+                    <a:bodyPr/>
+                    <a:lstStyle/>
+                    <a:p>
+                      <a:pPr marL="0" marR="0">
+                        <a:lnSpc>
+                          <a:spcPct val="107000"/>
+                        </a:lnSpc>
+                        <a:spcBef>
+                          <a:spcPts val="0"/>
+                        </a:spcBef>
+                        <a:spcAft>
+                          <a:spcPts val="800"/>
+                        </a:spcAft>
+                      </a:pPr>
+                      <a:r>
+                        <a:rPr lang="en-US" sz="1600" dirty="0">
+                          <a:effectLst/>
+                        </a:rPr>
+                        <a:t>Sunday</a:t>
+                      </a:r>
+                      <a:endParaRPr lang="en-US" sz="1600" dirty="0">
+                        <a:effectLst/>
+                        <a:latin typeface="Calibri" panose="020F0502020204030204" pitchFamily="34" charset="0"/>
+                        <a:ea typeface="Calibri" panose="020F0502020204030204" pitchFamily="34" charset="0"/>
+                        <a:cs typeface="Times New Roman" panose="02020603050405020304" pitchFamily="18" charset="0"/>
+                      </a:endParaRPr>
+                    </a:p>
+                  </a:txBody>
+                  <a:tcPr marL="15875" marR="15875" marT="15875" marB="15875" anchor="ctr">
+                    <a:lnL w="12700" cap="flat" cmpd="sng" algn="ctr">
+                      <a:solidFill>
+                        <a:schemeClr val="tx1"/>
+                      </a:solidFill>
+                      <a:prstDash val="solid"/>
+                      <a:round/>
+                      <a:headEnd type="none" w="med" len="med"/>
+                      <a:tailEnd type="none" w="med" len="med"/>
+                    </a:lnL>
+                    <a:lnR w="12700" cap="flat" cmpd="sng" algn="ctr">
+                      <a:solidFill>
+                        <a:schemeClr val="tx1"/>
+                      </a:solidFill>
+                      <a:prstDash val="solid"/>
+                      <a:round/>
+                      <a:headEnd type="none" w="med" len="med"/>
+                      <a:tailEnd type="none" w="med" len="med"/>
+                    </a:lnR>
+                    <a:lnT w="12700" cap="flat" cmpd="sng" algn="ctr">
+                      <a:solidFill>
+                        <a:schemeClr val="tx1"/>
+                      </a:solidFill>
+                      <a:prstDash val="solid"/>
+                      <a:round/>
+                      <a:headEnd type="none" w="med" len="med"/>
+                      <a:tailEnd type="none" w="med" len="med"/>
+                    </a:lnT>
+                    <a:lnB w="12700" cap="flat" cmpd="sng" algn="ctr">
+                      <a:solidFill>
+                        <a:schemeClr val="tx1"/>
+                      </a:solidFill>
+                      <a:prstDash val="solid"/>
+                      <a:round/>
+                      <a:headEnd type="none" w="med" len="med"/>
+                      <a:tailEnd type="none" w="med" len="med"/>
+                    </a:lnB>
+                    <a:lnTlToBr w="12700" cmpd="sng">
+                      <a:noFill/>
+                      <a:prstDash val="solid"/>
+                    </a:lnTlToBr>
+                    <a:lnBlToTr w="12700" cmpd="sng">
+                      <a:noFill/>
+                      <a:prstDash val="solid"/>
+                    </a:lnBlToTr>
+                    <a:solidFill>
+                      <a:schemeClr val="bg1"/>
+                    </a:solidFill>
+                  </a:tcPr>
+                </a:tc>
+                <a:tc>
+                  <a:txBody>
+                    <a:bodyPr/>
+                    <a:lstStyle/>
+                    <a:p>
+                      <a:pPr marL="0" marR="0">
+                        <a:lnSpc>
+                          <a:spcPct val="107000"/>
+                        </a:lnSpc>
+                        <a:spcBef>
+                          <a:spcPts val="0"/>
+                        </a:spcBef>
+                        <a:spcAft>
+                          <a:spcPts val="800"/>
+                        </a:spcAft>
+                      </a:pPr>
+                      <a:r>
+                        <a:rPr lang="en-US" sz="1600" dirty="0">
+                          <a:effectLst/>
+                        </a:rPr>
+                        <a:t>12 PM - 4 PM : Teams</a:t>
+                      </a:r>
+                      <a:endParaRPr lang="en-US" sz="1600" dirty="0">
+                        <a:effectLst/>
+                        <a:latin typeface="Calibri" panose="020F0502020204030204" pitchFamily="34" charset="0"/>
+                        <a:ea typeface="Calibri" panose="020F0502020204030204" pitchFamily="34" charset="0"/>
+                        <a:cs typeface="Times New Roman" panose="02020603050405020304" pitchFamily="18" charset="0"/>
+                      </a:endParaRPr>
+                    </a:p>
+                  </a:txBody>
+                  <a:tcPr marL="15875" marR="15875" marT="15875" marB="15875" anchor="ctr">
+                    <a:lnL w="12700" cap="flat" cmpd="sng" algn="ctr">
+                      <a:solidFill>
+                        <a:schemeClr val="tx1"/>
+                      </a:solidFill>
+                      <a:prstDash val="solid"/>
+                      <a:round/>
+                      <a:headEnd type="none" w="med" len="med"/>
+                      <a:tailEnd type="none" w="med" len="med"/>
+                    </a:lnL>
+                    <a:lnR w="12700" cap="flat" cmpd="sng" algn="ctr">
+                      <a:solidFill>
+                        <a:schemeClr val="tx1"/>
+                      </a:solidFill>
+                      <a:prstDash val="solid"/>
+                      <a:round/>
+                      <a:headEnd type="none" w="med" len="med"/>
+                      <a:tailEnd type="none" w="med" len="med"/>
+                    </a:lnR>
+                    <a:lnT w="12700" cap="flat" cmpd="sng" algn="ctr">
+                      <a:solidFill>
+                        <a:schemeClr val="tx1"/>
+                      </a:solidFill>
+                      <a:prstDash val="solid"/>
+                      <a:round/>
+                      <a:headEnd type="none" w="med" len="med"/>
+                      <a:tailEnd type="none" w="med" len="med"/>
+                    </a:lnT>
+                    <a:lnB w="12700" cap="flat" cmpd="sng" algn="ctr">
+                      <a:solidFill>
+                        <a:schemeClr val="tx1"/>
+                      </a:solidFill>
+                      <a:prstDash val="solid"/>
+                      <a:round/>
+                      <a:headEnd type="none" w="med" len="med"/>
+                      <a:tailEnd type="none" w="med" len="med"/>
+                    </a:lnB>
+                    <a:lnTlToBr w="12700" cmpd="sng">
+                      <a:noFill/>
+                      <a:prstDash val="solid"/>
+                    </a:lnTlToBr>
+                    <a:lnBlToTr w="12700" cmpd="sng">
+                      <a:noFill/>
+                      <a:prstDash val="solid"/>
+                    </a:lnBlToTr>
+                    <a:solidFill>
+                      <a:schemeClr val="bg1"/>
+                    </a:solidFill>
+                  </a:tcPr>
+                </a:tc>
+                <a:extLst>
+                  <a:ext uri="{0D108BD9-81ED-4DB2-BD59-A6C34878D82A}">
+                    <a16:rowId xmlns:a16="http://schemas.microsoft.com/office/drawing/2014/main" val="1928039740"/>
+                  </a:ext>
+                </a:extLst>
+              </a:tr>
+            </a:tbl>
+          </a:graphicData>
+        </a:graphic>
+      </p:graphicFrame>
     </p:spTree>
     <p:extLst>
       <p:ext uri="{BB962C8B-B14F-4D97-AF65-F5344CB8AC3E}">
@@ -19723,20 +20006,20 @@
 </file>
 
 <file path=customXml/item2.xml><?xml version="1.0" encoding="utf-8"?>
+<p:properties xmlns:p="http://schemas.microsoft.com/office/2006/metadata/properties" xmlns:xsi="http://www.w3.org/2001/XMLSchema-instance" xmlns:pc="http://schemas.microsoft.com/office/infopath/2007/PartnerControls">
+  <documentManagement>
+    <_activity xmlns="92c41bee-f0ee-4aa6-9399-a35fbb883510" xsi:nil="true"/>
+  </documentManagement>
+</p:properties>
+</file>
+
+<file path=customXml/item3.xml><?xml version="1.0" encoding="utf-8"?>
 <?mso-contentType ?>
 <FormTemplates xmlns="http://schemas.microsoft.com/sharepoint/v3/contenttype/forms">
   <Display>DocumentLibraryForm</Display>
   <Edit>DocumentLibraryForm</Edit>
   <New>DocumentLibraryForm</New>
 </FormTemplates>
-</file>
-
-<file path=customXml/item3.xml><?xml version="1.0" encoding="utf-8"?>
-<p:properties xmlns:p="http://schemas.microsoft.com/office/2006/metadata/properties" xmlns:xsi="http://www.w3.org/2001/XMLSchema-instance" xmlns:pc="http://schemas.microsoft.com/office/infopath/2007/PartnerControls">
-  <documentManagement>
-    <_activity xmlns="92c41bee-f0ee-4aa6-9399-a35fbb883510" xsi:nil="true"/>
-  </documentManagement>
-</p:properties>
 </file>
 
 <file path=customXml/itemProps1.xml><?xml version="1.0" encoding="utf-8"?>
@@ -19759,26 +20042,26 @@
 </file>
 
 <file path=customXml/itemProps2.xml><?xml version="1.0" encoding="utf-8"?>
+<ds:datastoreItem xmlns:ds="http://schemas.openxmlformats.org/officeDocument/2006/customXml" ds:itemID="{0FD40C3E-5C66-4D43-864D-0A2EF5C6FB03}">
+  <ds:schemaRefs>
+    <ds:schemaRef ds:uri="http://www.w3.org/XML/1998/namespace"/>
+    <ds:schemaRef ds:uri="http://schemas.openxmlformats.org/package/2006/metadata/core-properties"/>
+    <ds:schemaRef ds:uri="http://schemas.microsoft.com/office/2006/metadata/properties"/>
+    <ds:schemaRef ds:uri="http://purl.org/dc/terms/"/>
+    <ds:schemaRef ds:uri="http://schemas.microsoft.com/office/infopath/2007/PartnerControls"/>
+    <ds:schemaRef ds:uri="http://purl.org/dc/elements/1.1/"/>
+    <ds:schemaRef ds:uri="http://schemas.microsoft.com/office/2006/documentManagement/types"/>
+    <ds:schemaRef ds:uri="http://purl.org/dc/dcmitype/"/>
+    <ds:schemaRef ds:uri="e06ed288-fd75-4b50-bbed-f5a5df88c31c"/>
+    <ds:schemaRef ds:uri="92c41bee-f0ee-4aa6-9399-a35fbb883510"/>
+  </ds:schemaRefs>
+</ds:datastoreItem>
+</file>
+
+<file path=customXml/itemProps3.xml><?xml version="1.0" encoding="utf-8"?>
 <ds:datastoreItem xmlns:ds="http://schemas.openxmlformats.org/officeDocument/2006/customXml" ds:itemID="{7454CE77-4916-4D54-8EE2-50A87C88C4FF}">
   <ds:schemaRefs>
     <ds:schemaRef ds:uri="http://schemas.microsoft.com/sharepoint/v3/contenttype/forms"/>
   </ds:schemaRefs>
 </ds:datastoreItem>
-</file>
-
-<file path=customXml/itemProps3.xml><?xml version="1.0" encoding="utf-8"?>
-<ds:datastoreItem xmlns:ds="http://schemas.openxmlformats.org/officeDocument/2006/customXml" ds:itemID="{0FD40C3E-5C66-4D43-864D-0A2EF5C6FB03}">
-  <ds:schemaRefs>
-    <ds:schemaRef ds:uri="http://www.w3.org/XML/1998/namespace"/>
-    <ds:schemaRef ds:uri="http://schemas.microsoft.com/office/2006/documentManagement/types"/>
-    <ds:schemaRef ds:uri="http://purl.org/dc/elements/1.1/"/>
-    <ds:schemaRef ds:uri="http://schemas.microsoft.com/office/2006/metadata/properties"/>
-    <ds:schemaRef ds:uri="http://schemas.microsoft.com/office/infopath/2007/PartnerControls"/>
-    <ds:schemaRef ds:uri="92c41bee-f0ee-4aa6-9399-a35fbb883510"/>
-    <ds:schemaRef ds:uri="e06ed288-fd75-4b50-bbed-f5a5df88c31c"/>
-    <ds:schemaRef ds:uri="http://purl.org/dc/dcmitype/"/>
-    <ds:schemaRef ds:uri="http://schemas.openxmlformats.org/package/2006/metadata/core-properties"/>
-    <ds:schemaRef ds:uri="http://purl.org/dc/terms/"/>
-  </ds:schemaRefs>
-</ds:datastoreItem>
 </file>
</xml_diff>